<commit_message>
added point of view, user feedback, transcribed user feedback
</commit_message>
<xml_diff>
--- a/userdes.pptx
+++ b/userdes.pptx
@@ -11,14 +11,17 @@
     <p:sldId id="262" r:id="rId8"/>
     <p:sldId id="263" r:id="rId9"/>
     <p:sldId id="267" r:id="rId10"/>
-    <p:sldId id="266" r:id="rId11"/>
-    <p:sldId id="268" r:id="rId12"/>
-    <p:sldId id="256" r:id="rId13"/>
-    <p:sldId id="257" r:id="rId14"/>
-    <p:sldId id="265" r:id="rId15"/>
-    <p:sldId id="258" r:id="rId16"/>
-    <p:sldId id="264" r:id="rId17"/>
-    <p:sldId id="269" r:id="rId18"/>
+    <p:sldId id="270" r:id="rId11"/>
+    <p:sldId id="266" r:id="rId12"/>
+    <p:sldId id="268" r:id="rId13"/>
+    <p:sldId id="256" r:id="rId14"/>
+    <p:sldId id="257" r:id="rId15"/>
+    <p:sldId id="265" r:id="rId16"/>
+    <p:sldId id="258" r:id="rId17"/>
+    <p:sldId id="264" r:id="rId18"/>
+    <p:sldId id="271" r:id="rId19"/>
+    <p:sldId id="272" r:id="rId20"/>
+    <p:sldId id="269" r:id="rId21"/>
   </p:sldIdLst>
   <p:sldSz cx="12192000" cy="6858000"/>
   <p:notesSz cx="6858000" cy="9144000"/>
@@ -274,7 +277,7 @@
           <a:p>
             <a:fld id="{12A9C0E6-86DB-4A33-A939-551AD288B0D1}" type="datetimeFigureOut">
               <a:rPr lang="en-PH" smtClean="0"/>
-              <a:t>08/08/2019</a:t>
+              <a:t>15/09/2019</a:t>
             </a:fld>
             <a:endParaRPr lang="en-PH"/>
           </a:p>
@@ -474,7 +477,7 @@
           <a:p>
             <a:fld id="{12A9C0E6-86DB-4A33-A939-551AD288B0D1}" type="datetimeFigureOut">
               <a:rPr lang="en-PH" smtClean="0"/>
-              <a:t>08/08/2019</a:t>
+              <a:t>15/09/2019</a:t>
             </a:fld>
             <a:endParaRPr lang="en-PH"/>
           </a:p>
@@ -684,7 +687,7 @@
           <a:p>
             <a:fld id="{12A9C0E6-86DB-4A33-A939-551AD288B0D1}" type="datetimeFigureOut">
               <a:rPr lang="en-PH" smtClean="0"/>
-              <a:t>08/08/2019</a:t>
+              <a:t>15/09/2019</a:t>
             </a:fld>
             <a:endParaRPr lang="en-PH"/>
           </a:p>
@@ -884,7 +887,7 @@
           <a:p>
             <a:fld id="{12A9C0E6-86DB-4A33-A939-551AD288B0D1}" type="datetimeFigureOut">
               <a:rPr lang="en-PH" smtClean="0"/>
-              <a:t>08/08/2019</a:t>
+              <a:t>15/09/2019</a:t>
             </a:fld>
             <a:endParaRPr lang="en-PH"/>
           </a:p>
@@ -1160,7 +1163,7 @@
           <a:p>
             <a:fld id="{12A9C0E6-86DB-4A33-A939-551AD288B0D1}" type="datetimeFigureOut">
               <a:rPr lang="en-PH" smtClean="0"/>
-              <a:t>08/08/2019</a:t>
+              <a:t>15/09/2019</a:t>
             </a:fld>
             <a:endParaRPr lang="en-PH"/>
           </a:p>
@@ -1428,7 +1431,7 @@
           <a:p>
             <a:fld id="{12A9C0E6-86DB-4A33-A939-551AD288B0D1}" type="datetimeFigureOut">
               <a:rPr lang="en-PH" smtClean="0"/>
-              <a:t>08/08/2019</a:t>
+              <a:t>15/09/2019</a:t>
             </a:fld>
             <a:endParaRPr lang="en-PH"/>
           </a:p>
@@ -1843,7 +1846,7 @@
           <a:p>
             <a:fld id="{12A9C0E6-86DB-4A33-A939-551AD288B0D1}" type="datetimeFigureOut">
               <a:rPr lang="en-PH" smtClean="0"/>
-              <a:t>08/08/2019</a:t>
+              <a:t>15/09/2019</a:t>
             </a:fld>
             <a:endParaRPr lang="en-PH"/>
           </a:p>
@@ -1985,7 +1988,7 @@
           <a:p>
             <a:fld id="{12A9C0E6-86DB-4A33-A939-551AD288B0D1}" type="datetimeFigureOut">
               <a:rPr lang="en-PH" smtClean="0"/>
-              <a:t>08/08/2019</a:t>
+              <a:t>15/09/2019</a:t>
             </a:fld>
             <a:endParaRPr lang="en-PH"/>
           </a:p>
@@ -2098,7 +2101,7 @@
           <a:p>
             <a:fld id="{12A9C0E6-86DB-4A33-A939-551AD288B0D1}" type="datetimeFigureOut">
               <a:rPr lang="en-PH" smtClean="0"/>
-              <a:t>08/08/2019</a:t>
+              <a:t>15/09/2019</a:t>
             </a:fld>
             <a:endParaRPr lang="en-PH"/>
           </a:p>
@@ -2411,7 +2414,7 @@
           <a:p>
             <a:fld id="{12A9C0E6-86DB-4A33-A939-551AD288B0D1}" type="datetimeFigureOut">
               <a:rPr lang="en-PH" smtClean="0"/>
-              <a:t>08/08/2019</a:t>
+              <a:t>15/09/2019</a:t>
             </a:fld>
             <a:endParaRPr lang="en-PH"/>
           </a:p>
@@ -2700,7 +2703,7 @@
           <a:p>
             <a:fld id="{12A9C0E6-86DB-4A33-A939-551AD288B0D1}" type="datetimeFigureOut">
               <a:rPr lang="en-PH" smtClean="0"/>
-              <a:t>08/08/2019</a:t>
+              <a:t>15/09/2019</a:t>
             </a:fld>
             <a:endParaRPr lang="en-PH"/>
           </a:p>
@@ -2943,7 +2946,7 @@
           <a:p>
             <a:fld id="{12A9C0E6-86DB-4A33-A939-551AD288B0D1}" type="datetimeFigureOut">
               <a:rPr lang="en-PH" smtClean="0"/>
-              <a:t>08/08/2019</a:t>
+              <a:t>15/09/2019</a:t>
             </a:fld>
             <a:endParaRPr lang="en-PH"/>
           </a:p>
@@ -3648,6 +3651,1484 @@
       </p:grpSpPr>
       <p:grpSp>
         <p:nvGrpSpPr>
+          <p:cNvPr id="13" name="Group 12">
+            <a:extLst>
+              <a:ext uri="{FF2B5EF4-FFF2-40B4-BE49-F238E27FC236}">
+                <a16:creationId xmlns:a16="http://schemas.microsoft.com/office/drawing/2014/main" id="{FEFCE114-C2B0-4848-86BC-85AC8BA9CCEA}"/>
+              </a:ext>
+            </a:extLst>
+          </p:cNvPr>
+          <p:cNvGrpSpPr/>
+          <p:nvPr/>
+        </p:nvGrpSpPr>
+        <p:grpSpPr>
+          <a:xfrm>
+            <a:off x="8063946" y="268356"/>
+            <a:ext cx="3697357" cy="6321287"/>
+            <a:chOff x="318052" y="238539"/>
+            <a:chExt cx="3697357" cy="6321287"/>
+          </a:xfrm>
+        </p:grpSpPr>
+        <p:sp>
+          <p:nvSpPr>
+            <p:cNvPr id="12" name="Rectangle 11">
+              <a:extLst>
+                <a:ext uri="{FF2B5EF4-FFF2-40B4-BE49-F238E27FC236}">
+                  <a16:creationId xmlns:a16="http://schemas.microsoft.com/office/drawing/2014/main" id="{FB6E30D5-3059-4768-8D72-A2C4584983B4}"/>
+                </a:ext>
+              </a:extLst>
+            </p:cNvPr>
+            <p:cNvSpPr/>
+            <p:nvPr/>
+          </p:nvSpPr>
+          <p:spPr>
+            <a:xfrm>
+              <a:off x="1364974" y="4320042"/>
+              <a:ext cx="1577009" cy="523220"/>
+            </a:xfrm>
+            <a:prstGeom prst="rect">
+              <a:avLst/>
+            </a:prstGeom>
+            <a:noFill/>
+            <a:ln>
+              <a:solidFill>
+                <a:schemeClr val="tx1"/>
+              </a:solidFill>
+            </a:ln>
+          </p:spPr>
+          <p:style>
+            <a:lnRef idx="2">
+              <a:schemeClr val="accent1">
+                <a:shade val="50000"/>
+              </a:schemeClr>
+            </a:lnRef>
+            <a:fillRef idx="1">
+              <a:schemeClr val="accent1"/>
+            </a:fillRef>
+            <a:effectRef idx="0">
+              <a:schemeClr val="accent1"/>
+            </a:effectRef>
+            <a:fontRef idx="minor">
+              <a:schemeClr val="lt1"/>
+            </a:fontRef>
+          </p:style>
+          <p:txBody>
+            <a:bodyPr rtlCol="0" anchor="ctr"/>
+            <a:lstStyle/>
+            <a:p>
+              <a:pPr algn="ctr"/>
+              <a:endParaRPr lang="en-PH"/>
+            </a:p>
+          </p:txBody>
+        </p:sp>
+        <p:sp>
+          <p:nvSpPr>
+            <p:cNvPr id="5" name="Rectangle: Rounded Corners 4">
+              <a:extLst>
+                <a:ext uri="{FF2B5EF4-FFF2-40B4-BE49-F238E27FC236}">
+                  <a16:creationId xmlns:a16="http://schemas.microsoft.com/office/drawing/2014/main" id="{A0068AB8-F468-431F-A6B5-2F981DC0705D}"/>
+                </a:ext>
+              </a:extLst>
+            </p:cNvPr>
+            <p:cNvSpPr/>
+            <p:nvPr/>
+          </p:nvSpPr>
+          <p:spPr>
+            <a:xfrm>
+              <a:off x="318052" y="238539"/>
+              <a:ext cx="3697357" cy="6321287"/>
+            </a:xfrm>
+            <a:prstGeom prst="roundRect">
+              <a:avLst/>
+            </a:prstGeom>
+            <a:noFill/>
+            <a:ln>
+              <a:solidFill>
+                <a:schemeClr val="tx1"/>
+              </a:solidFill>
+            </a:ln>
+          </p:spPr>
+          <p:style>
+            <a:lnRef idx="2">
+              <a:schemeClr val="accent1">
+                <a:shade val="50000"/>
+              </a:schemeClr>
+            </a:lnRef>
+            <a:fillRef idx="1">
+              <a:schemeClr val="accent1"/>
+            </a:fillRef>
+            <a:effectRef idx="0">
+              <a:schemeClr val="accent1"/>
+            </a:effectRef>
+            <a:fontRef idx="minor">
+              <a:schemeClr val="lt1"/>
+            </a:fontRef>
+          </p:style>
+          <p:txBody>
+            <a:bodyPr rtlCol="0" anchor="ctr"/>
+            <a:lstStyle/>
+            <a:p>
+              <a:pPr algn="ctr"/>
+              <a:endParaRPr lang="en-PH"/>
+            </a:p>
+          </p:txBody>
+        </p:sp>
+        <p:sp>
+          <p:nvSpPr>
+            <p:cNvPr id="6" name="Rectangle: Rounded Corners 5">
+              <a:extLst>
+                <a:ext uri="{FF2B5EF4-FFF2-40B4-BE49-F238E27FC236}">
+                  <a16:creationId xmlns:a16="http://schemas.microsoft.com/office/drawing/2014/main" id="{5D35D462-3A75-4FB6-8E8A-FF6E9B6FC323}"/>
+                </a:ext>
+              </a:extLst>
+            </p:cNvPr>
+            <p:cNvSpPr/>
+            <p:nvPr/>
+          </p:nvSpPr>
+          <p:spPr>
+            <a:xfrm>
+              <a:off x="622852" y="927651"/>
+              <a:ext cx="3048000" cy="4943061"/>
+            </a:xfrm>
+            <a:prstGeom prst="roundRect">
+              <a:avLst/>
+            </a:prstGeom>
+            <a:solidFill>
+              <a:srgbClr val="FFC000"/>
+            </a:solidFill>
+            <a:ln>
+              <a:solidFill>
+                <a:schemeClr val="tx1"/>
+              </a:solidFill>
+            </a:ln>
+          </p:spPr>
+          <p:style>
+            <a:lnRef idx="2">
+              <a:schemeClr val="accent1">
+                <a:shade val="50000"/>
+              </a:schemeClr>
+            </a:lnRef>
+            <a:fillRef idx="1">
+              <a:schemeClr val="accent1"/>
+            </a:fillRef>
+            <a:effectRef idx="0">
+              <a:schemeClr val="accent1"/>
+            </a:effectRef>
+            <a:fontRef idx="minor">
+              <a:schemeClr val="lt1"/>
+            </a:fontRef>
+          </p:style>
+          <p:txBody>
+            <a:bodyPr rtlCol="0" anchor="ctr"/>
+            <a:lstStyle/>
+            <a:p>
+              <a:pPr algn="ctr"/>
+              <a:endParaRPr lang="en-PH"/>
+            </a:p>
+          </p:txBody>
+        </p:sp>
+      </p:grpSp>
+      <p:grpSp>
+        <p:nvGrpSpPr>
+          <p:cNvPr id="14" name="Group 13">
+            <a:extLst>
+              <a:ext uri="{FF2B5EF4-FFF2-40B4-BE49-F238E27FC236}">
+                <a16:creationId xmlns:a16="http://schemas.microsoft.com/office/drawing/2014/main" id="{2C60ABC9-F770-42CA-B114-04AFD08352DC}"/>
+              </a:ext>
+            </a:extLst>
+          </p:cNvPr>
+          <p:cNvGrpSpPr/>
+          <p:nvPr/>
+        </p:nvGrpSpPr>
+        <p:grpSpPr>
+          <a:xfrm>
+            <a:off x="318049" y="268356"/>
+            <a:ext cx="3697357" cy="6321287"/>
+            <a:chOff x="318052" y="238539"/>
+            <a:chExt cx="3697357" cy="6321287"/>
+          </a:xfrm>
+        </p:grpSpPr>
+        <p:sp>
+          <p:nvSpPr>
+            <p:cNvPr id="15" name="Rectangle 14">
+              <a:extLst>
+                <a:ext uri="{FF2B5EF4-FFF2-40B4-BE49-F238E27FC236}">
+                  <a16:creationId xmlns:a16="http://schemas.microsoft.com/office/drawing/2014/main" id="{DCCB478B-FFCE-49F2-9519-385895F93F22}"/>
+                </a:ext>
+              </a:extLst>
+            </p:cNvPr>
+            <p:cNvSpPr/>
+            <p:nvPr/>
+          </p:nvSpPr>
+          <p:spPr>
+            <a:xfrm>
+              <a:off x="1364974" y="4320042"/>
+              <a:ext cx="1577009" cy="523220"/>
+            </a:xfrm>
+            <a:prstGeom prst="rect">
+              <a:avLst/>
+            </a:prstGeom>
+            <a:noFill/>
+            <a:ln>
+              <a:solidFill>
+                <a:schemeClr val="tx1"/>
+              </a:solidFill>
+            </a:ln>
+          </p:spPr>
+          <p:style>
+            <a:lnRef idx="2">
+              <a:schemeClr val="accent1">
+                <a:shade val="50000"/>
+              </a:schemeClr>
+            </a:lnRef>
+            <a:fillRef idx="1">
+              <a:schemeClr val="accent1"/>
+            </a:fillRef>
+            <a:effectRef idx="0">
+              <a:schemeClr val="accent1"/>
+            </a:effectRef>
+            <a:fontRef idx="minor">
+              <a:schemeClr val="lt1"/>
+            </a:fontRef>
+          </p:style>
+          <p:txBody>
+            <a:bodyPr rtlCol="0" anchor="ctr"/>
+            <a:lstStyle/>
+            <a:p>
+              <a:pPr algn="ctr"/>
+              <a:endParaRPr lang="en-PH"/>
+            </a:p>
+          </p:txBody>
+        </p:sp>
+        <p:sp>
+          <p:nvSpPr>
+            <p:cNvPr id="16" name="Rectangle: Rounded Corners 15">
+              <a:extLst>
+                <a:ext uri="{FF2B5EF4-FFF2-40B4-BE49-F238E27FC236}">
+                  <a16:creationId xmlns:a16="http://schemas.microsoft.com/office/drawing/2014/main" id="{B0D6BFE9-7759-44A0-B8B1-AFDE0EAA6F94}"/>
+                </a:ext>
+              </a:extLst>
+            </p:cNvPr>
+            <p:cNvSpPr/>
+            <p:nvPr/>
+          </p:nvSpPr>
+          <p:spPr>
+            <a:xfrm>
+              <a:off x="318052" y="238539"/>
+              <a:ext cx="3697357" cy="6321287"/>
+            </a:xfrm>
+            <a:prstGeom prst="roundRect">
+              <a:avLst/>
+            </a:prstGeom>
+            <a:noFill/>
+            <a:ln>
+              <a:solidFill>
+                <a:schemeClr val="tx1"/>
+              </a:solidFill>
+            </a:ln>
+          </p:spPr>
+          <p:style>
+            <a:lnRef idx="2">
+              <a:schemeClr val="accent1">
+                <a:shade val="50000"/>
+              </a:schemeClr>
+            </a:lnRef>
+            <a:fillRef idx="1">
+              <a:schemeClr val="accent1"/>
+            </a:fillRef>
+            <a:effectRef idx="0">
+              <a:schemeClr val="accent1"/>
+            </a:effectRef>
+            <a:fontRef idx="minor">
+              <a:schemeClr val="lt1"/>
+            </a:fontRef>
+          </p:style>
+          <p:txBody>
+            <a:bodyPr rtlCol="0" anchor="ctr"/>
+            <a:lstStyle/>
+            <a:p>
+              <a:pPr algn="ctr"/>
+              <a:endParaRPr lang="en-PH"/>
+            </a:p>
+          </p:txBody>
+        </p:sp>
+        <p:sp>
+          <p:nvSpPr>
+            <p:cNvPr id="17" name="Rectangle: Rounded Corners 16">
+              <a:extLst>
+                <a:ext uri="{FF2B5EF4-FFF2-40B4-BE49-F238E27FC236}">
+                  <a16:creationId xmlns:a16="http://schemas.microsoft.com/office/drawing/2014/main" id="{73BFF76E-2242-45AB-9CBB-67CA5C18A08F}"/>
+                </a:ext>
+              </a:extLst>
+            </p:cNvPr>
+            <p:cNvSpPr/>
+            <p:nvPr/>
+          </p:nvSpPr>
+          <p:spPr>
+            <a:xfrm>
+              <a:off x="622852" y="927651"/>
+              <a:ext cx="3048000" cy="4943061"/>
+            </a:xfrm>
+            <a:prstGeom prst="roundRect">
+              <a:avLst/>
+            </a:prstGeom>
+            <a:solidFill>
+              <a:srgbClr val="FFC000"/>
+            </a:solidFill>
+            <a:ln>
+              <a:solidFill>
+                <a:schemeClr val="tx1"/>
+              </a:solidFill>
+            </a:ln>
+          </p:spPr>
+          <p:style>
+            <a:lnRef idx="2">
+              <a:schemeClr val="accent1">
+                <a:shade val="50000"/>
+              </a:schemeClr>
+            </a:lnRef>
+            <a:fillRef idx="1">
+              <a:schemeClr val="accent1"/>
+            </a:fillRef>
+            <a:effectRef idx="0">
+              <a:schemeClr val="accent1"/>
+            </a:effectRef>
+            <a:fontRef idx="minor">
+              <a:schemeClr val="lt1"/>
+            </a:fontRef>
+          </p:style>
+          <p:txBody>
+            <a:bodyPr rtlCol="0" anchor="ctr"/>
+            <a:lstStyle/>
+            <a:p>
+              <a:pPr algn="ctr"/>
+              <a:endParaRPr lang="en-PH" dirty="0"/>
+            </a:p>
+          </p:txBody>
+        </p:sp>
+        <p:sp>
+          <p:nvSpPr>
+            <p:cNvPr id="18" name="TextBox 17">
+              <a:extLst>
+                <a:ext uri="{FF2B5EF4-FFF2-40B4-BE49-F238E27FC236}">
+                  <a16:creationId xmlns:a16="http://schemas.microsoft.com/office/drawing/2014/main" id="{689FCB6D-27FC-41CA-8BB5-CA7C220704E0}"/>
+                </a:ext>
+              </a:extLst>
+            </p:cNvPr>
+            <p:cNvSpPr txBox="1"/>
+            <p:nvPr/>
+          </p:nvSpPr>
+          <p:spPr>
+            <a:xfrm>
+              <a:off x="1119808" y="1630018"/>
+              <a:ext cx="2054087" cy="646331"/>
+            </a:xfrm>
+            <a:prstGeom prst="rect">
+              <a:avLst/>
+            </a:prstGeom>
+            <a:noFill/>
+          </p:spPr>
+          <p:txBody>
+            <a:bodyPr wrap="square" rtlCol="0">
+              <a:spAutoFit/>
+            </a:bodyPr>
+            <a:lstStyle/>
+            <a:p>
+              <a:pPr algn="ctr"/>
+              <a:r>
+                <a:rPr lang="en-PH" sz="3600" b="1" dirty="0">
+                  <a:latin typeface="Gill Sans MT" panose="020B0502020104020203" pitchFamily="34" charset="0"/>
+                </a:rPr>
+                <a:t>HANAP </a:t>
+              </a:r>
+            </a:p>
+          </p:txBody>
+        </p:sp>
+        <p:sp>
+          <p:nvSpPr>
+            <p:cNvPr id="19" name="TextBox 18">
+              <a:extLst>
+                <a:ext uri="{FF2B5EF4-FFF2-40B4-BE49-F238E27FC236}">
+                  <a16:creationId xmlns:a16="http://schemas.microsoft.com/office/drawing/2014/main" id="{696D6BCE-F8F0-461B-81D9-50AABAE1BE8D}"/>
+                </a:ext>
+              </a:extLst>
+            </p:cNvPr>
+            <p:cNvSpPr txBox="1"/>
+            <p:nvPr/>
+          </p:nvSpPr>
+          <p:spPr>
+            <a:xfrm>
+              <a:off x="1139686" y="2166731"/>
+              <a:ext cx="2054087" cy="646331"/>
+            </a:xfrm>
+            <a:prstGeom prst="rect">
+              <a:avLst/>
+            </a:prstGeom>
+            <a:noFill/>
+          </p:spPr>
+          <p:txBody>
+            <a:bodyPr wrap="square" rtlCol="0">
+              <a:spAutoFit/>
+            </a:bodyPr>
+            <a:lstStyle/>
+            <a:p>
+              <a:pPr algn="ctr"/>
+              <a:r>
+                <a:rPr lang="en-PH" sz="3600" b="1" dirty="0">
+                  <a:latin typeface="Gill Sans MT" panose="020B0502020104020203" pitchFamily="34" charset="0"/>
+                </a:rPr>
+                <a:t>PC </a:t>
+              </a:r>
+            </a:p>
+          </p:txBody>
+        </p:sp>
+      </p:grpSp>
+      <p:grpSp>
+        <p:nvGrpSpPr>
+          <p:cNvPr id="28" name="Group 27">
+            <a:extLst>
+              <a:ext uri="{FF2B5EF4-FFF2-40B4-BE49-F238E27FC236}">
+                <a16:creationId xmlns:a16="http://schemas.microsoft.com/office/drawing/2014/main" id="{A6415594-4A73-4D16-8A76-1C2B8B18DCB7}"/>
+              </a:ext>
+            </a:extLst>
+          </p:cNvPr>
+          <p:cNvGrpSpPr/>
+          <p:nvPr/>
+        </p:nvGrpSpPr>
+        <p:grpSpPr>
+          <a:xfrm>
+            <a:off x="4214189" y="268356"/>
+            <a:ext cx="3697357" cy="6321287"/>
+            <a:chOff x="318052" y="238539"/>
+            <a:chExt cx="3697357" cy="6321287"/>
+          </a:xfrm>
+        </p:grpSpPr>
+        <p:sp>
+          <p:nvSpPr>
+            <p:cNvPr id="29" name="Rectangle 28">
+              <a:extLst>
+                <a:ext uri="{FF2B5EF4-FFF2-40B4-BE49-F238E27FC236}">
+                  <a16:creationId xmlns:a16="http://schemas.microsoft.com/office/drawing/2014/main" id="{7B476E0B-2A02-4EF8-940A-80CD2B1CAF99}"/>
+                </a:ext>
+              </a:extLst>
+            </p:cNvPr>
+            <p:cNvSpPr/>
+            <p:nvPr/>
+          </p:nvSpPr>
+          <p:spPr>
+            <a:xfrm>
+              <a:off x="1364974" y="4320042"/>
+              <a:ext cx="1577009" cy="523220"/>
+            </a:xfrm>
+            <a:prstGeom prst="rect">
+              <a:avLst/>
+            </a:prstGeom>
+            <a:noFill/>
+            <a:ln>
+              <a:solidFill>
+                <a:schemeClr val="tx1"/>
+              </a:solidFill>
+            </a:ln>
+          </p:spPr>
+          <p:style>
+            <a:lnRef idx="2">
+              <a:schemeClr val="accent1">
+                <a:shade val="50000"/>
+              </a:schemeClr>
+            </a:lnRef>
+            <a:fillRef idx="1">
+              <a:schemeClr val="accent1"/>
+            </a:fillRef>
+            <a:effectRef idx="0">
+              <a:schemeClr val="accent1"/>
+            </a:effectRef>
+            <a:fontRef idx="minor">
+              <a:schemeClr val="lt1"/>
+            </a:fontRef>
+          </p:style>
+          <p:txBody>
+            <a:bodyPr rtlCol="0" anchor="ctr"/>
+            <a:lstStyle/>
+            <a:p>
+              <a:pPr algn="ctr"/>
+              <a:endParaRPr lang="en-PH"/>
+            </a:p>
+          </p:txBody>
+        </p:sp>
+        <p:sp>
+          <p:nvSpPr>
+            <p:cNvPr id="30" name="Rectangle: Rounded Corners 29">
+              <a:extLst>
+                <a:ext uri="{FF2B5EF4-FFF2-40B4-BE49-F238E27FC236}">
+                  <a16:creationId xmlns:a16="http://schemas.microsoft.com/office/drawing/2014/main" id="{473803C9-B3E4-4F64-BBB8-8659B9574A68}"/>
+                </a:ext>
+              </a:extLst>
+            </p:cNvPr>
+            <p:cNvSpPr/>
+            <p:nvPr/>
+          </p:nvSpPr>
+          <p:spPr>
+            <a:xfrm>
+              <a:off x="318052" y="238539"/>
+              <a:ext cx="3697357" cy="6321287"/>
+            </a:xfrm>
+            <a:prstGeom prst="roundRect">
+              <a:avLst/>
+            </a:prstGeom>
+            <a:noFill/>
+            <a:ln>
+              <a:solidFill>
+                <a:schemeClr val="tx1"/>
+              </a:solidFill>
+            </a:ln>
+          </p:spPr>
+          <p:style>
+            <a:lnRef idx="2">
+              <a:schemeClr val="accent1">
+                <a:shade val="50000"/>
+              </a:schemeClr>
+            </a:lnRef>
+            <a:fillRef idx="1">
+              <a:schemeClr val="accent1"/>
+            </a:fillRef>
+            <a:effectRef idx="0">
+              <a:schemeClr val="accent1"/>
+            </a:effectRef>
+            <a:fontRef idx="minor">
+              <a:schemeClr val="lt1"/>
+            </a:fontRef>
+          </p:style>
+          <p:txBody>
+            <a:bodyPr rtlCol="0" anchor="ctr"/>
+            <a:lstStyle/>
+            <a:p>
+              <a:pPr algn="ctr"/>
+              <a:endParaRPr lang="en-PH"/>
+            </a:p>
+          </p:txBody>
+        </p:sp>
+        <p:sp>
+          <p:nvSpPr>
+            <p:cNvPr id="31" name="Rectangle: Rounded Corners 30">
+              <a:extLst>
+                <a:ext uri="{FF2B5EF4-FFF2-40B4-BE49-F238E27FC236}">
+                  <a16:creationId xmlns:a16="http://schemas.microsoft.com/office/drawing/2014/main" id="{53BD5A12-9239-45F2-B201-60E1EAC0B4D9}"/>
+                </a:ext>
+              </a:extLst>
+            </p:cNvPr>
+            <p:cNvSpPr/>
+            <p:nvPr/>
+          </p:nvSpPr>
+          <p:spPr>
+            <a:xfrm>
+              <a:off x="622852" y="927651"/>
+              <a:ext cx="3048000" cy="4943061"/>
+            </a:xfrm>
+            <a:prstGeom prst="roundRect">
+              <a:avLst/>
+            </a:prstGeom>
+            <a:solidFill>
+              <a:srgbClr val="FFC000"/>
+            </a:solidFill>
+            <a:ln>
+              <a:solidFill>
+                <a:schemeClr val="tx1"/>
+              </a:solidFill>
+            </a:ln>
+          </p:spPr>
+          <p:style>
+            <a:lnRef idx="2">
+              <a:schemeClr val="accent1">
+                <a:shade val="50000"/>
+              </a:schemeClr>
+            </a:lnRef>
+            <a:fillRef idx="1">
+              <a:schemeClr val="accent1"/>
+            </a:fillRef>
+            <a:effectRef idx="0">
+              <a:schemeClr val="accent1"/>
+            </a:effectRef>
+            <a:fontRef idx="minor">
+              <a:schemeClr val="lt1"/>
+            </a:fontRef>
+          </p:style>
+          <p:txBody>
+            <a:bodyPr rtlCol="0" anchor="ctr"/>
+            <a:lstStyle/>
+            <a:p>
+              <a:pPr algn="ctr"/>
+              <a:endParaRPr lang="en-PH" dirty="0"/>
+            </a:p>
+          </p:txBody>
+        </p:sp>
+      </p:grpSp>
+      <p:sp>
+        <p:nvSpPr>
+          <p:cNvPr id="35" name="TextBox 34">
+            <a:extLst>
+              <a:ext uri="{FF2B5EF4-FFF2-40B4-BE49-F238E27FC236}">
+                <a16:creationId xmlns:a16="http://schemas.microsoft.com/office/drawing/2014/main" id="{7D5E5381-1F35-401C-9D71-13EA1DD114D2}"/>
+              </a:ext>
+            </a:extLst>
+          </p:cNvPr>
+          <p:cNvSpPr txBox="1"/>
+          <p:nvPr/>
+        </p:nvSpPr>
+        <p:spPr>
+          <a:xfrm>
+            <a:off x="980655" y="3166044"/>
+            <a:ext cx="2332386" cy="646331"/>
+          </a:xfrm>
+          <a:prstGeom prst="rect">
+            <a:avLst/>
+          </a:prstGeom>
+          <a:noFill/>
+        </p:spPr>
+        <p:txBody>
+          <a:bodyPr wrap="square" rtlCol="0">
+            <a:spAutoFit/>
+          </a:bodyPr>
+          <a:lstStyle/>
+          <a:p>
+            <a:pPr algn="ctr"/>
+            <a:r>
+              <a:rPr lang="en-PH" dirty="0"/>
+              <a:t>“Find cheapest pc rental near you.”</a:t>
+            </a:r>
+          </a:p>
+        </p:txBody>
+      </p:sp>
+      <p:sp>
+        <p:nvSpPr>
+          <p:cNvPr id="36" name="Rectangle 35">
+            <a:extLst>
+              <a:ext uri="{FF2B5EF4-FFF2-40B4-BE49-F238E27FC236}">
+                <a16:creationId xmlns:a16="http://schemas.microsoft.com/office/drawing/2014/main" id="{4E44DC3A-FF1F-4C0F-B477-98C09B503FEA}"/>
+              </a:ext>
+            </a:extLst>
+          </p:cNvPr>
+          <p:cNvSpPr/>
+          <p:nvPr/>
+        </p:nvSpPr>
+        <p:spPr>
+          <a:xfrm>
+            <a:off x="5411622" y="1186667"/>
+            <a:ext cx="1381541" cy="493644"/>
+          </a:xfrm>
+          <a:prstGeom prst="rect">
+            <a:avLst/>
+          </a:prstGeom>
+          <a:solidFill>
+            <a:schemeClr val="bg1"/>
+          </a:solidFill>
+        </p:spPr>
+        <p:style>
+          <a:lnRef idx="2">
+            <a:schemeClr val="accent1">
+              <a:shade val="50000"/>
+            </a:schemeClr>
+          </a:lnRef>
+          <a:fillRef idx="1">
+            <a:schemeClr val="accent1"/>
+          </a:fillRef>
+          <a:effectRef idx="0">
+            <a:schemeClr val="accent1"/>
+          </a:effectRef>
+          <a:fontRef idx="minor">
+            <a:schemeClr val="lt1"/>
+          </a:fontRef>
+        </p:style>
+        <p:txBody>
+          <a:bodyPr rtlCol="0" anchor="ctr"/>
+          <a:lstStyle/>
+          <a:p>
+            <a:pPr algn="ctr"/>
+            <a:r>
+              <a:rPr lang="en-PH" dirty="0">
+                <a:solidFill>
+                  <a:schemeClr val="tx1"/>
+                </a:solidFill>
+              </a:rPr>
+              <a:t>Nearest</a:t>
+            </a:r>
+          </a:p>
+        </p:txBody>
+      </p:sp>
+      <p:sp>
+        <p:nvSpPr>
+          <p:cNvPr id="41" name="Rectangle 40">
+            <a:extLst>
+              <a:ext uri="{FF2B5EF4-FFF2-40B4-BE49-F238E27FC236}">
+                <a16:creationId xmlns:a16="http://schemas.microsoft.com/office/drawing/2014/main" id="{D8D88DFF-8C65-4B5E-8820-E8CFDE3D2A05}"/>
+              </a:ext>
+            </a:extLst>
+          </p:cNvPr>
+          <p:cNvSpPr/>
+          <p:nvPr/>
+        </p:nvSpPr>
+        <p:spPr>
+          <a:xfrm>
+            <a:off x="1364970" y="4463922"/>
+            <a:ext cx="1381540" cy="493644"/>
+          </a:xfrm>
+          <a:prstGeom prst="rect">
+            <a:avLst/>
+          </a:prstGeom>
+          <a:solidFill>
+            <a:schemeClr val="bg1"/>
+          </a:solidFill>
+          <a:ln>
+            <a:solidFill>
+              <a:schemeClr val="tx1"/>
+            </a:solidFill>
+          </a:ln>
+        </p:spPr>
+        <p:style>
+          <a:lnRef idx="2">
+            <a:schemeClr val="accent1">
+              <a:shade val="50000"/>
+            </a:schemeClr>
+          </a:lnRef>
+          <a:fillRef idx="1">
+            <a:schemeClr val="accent1"/>
+          </a:fillRef>
+          <a:effectRef idx="0">
+            <a:schemeClr val="accent1"/>
+          </a:effectRef>
+          <a:fontRef idx="minor">
+            <a:schemeClr val="lt1"/>
+          </a:fontRef>
+        </p:style>
+        <p:txBody>
+          <a:bodyPr rtlCol="0" anchor="ctr"/>
+          <a:lstStyle/>
+          <a:p>
+            <a:pPr algn="ctr"/>
+            <a:r>
+              <a:rPr lang="en-PH" dirty="0">
+                <a:solidFill>
+                  <a:schemeClr val="tx1"/>
+                </a:solidFill>
+              </a:rPr>
+              <a:t>Cheapest</a:t>
+            </a:r>
+          </a:p>
+        </p:txBody>
+      </p:sp>
+      <p:sp>
+        <p:nvSpPr>
+          <p:cNvPr id="47" name="Rectangle 46">
+            <a:extLst>
+              <a:ext uri="{FF2B5EF4-FFF2-40B4-BE49-F238E27FC236}">
+                <a16:creationId xmlns:a16="http://schemas.microsoft.com/office/drawing/2014/main" id="{5BCF8B10-0EED-47C3-BA34-9C31CF114545}"/>
+              </a:ext>
+            </a:extLst>
+          </p:cNvPr>
+          <p:cNvSpPr/>
+          <p:nvPr/>
+        </p:nvSpPr>
+        <p:spPr>
+          <a:xfrm>
+            <a:off x="4833026" y="2081632"/>
+            <a:ext cx="2459682" cy="493644"/>
+          </a:xfrm>
+          <a:prstGeom prst="rect">
+            <a:avLst/>
+          </a:prstGeom>
+          <a:solidFill>
+            <a:schemeClr val="tx1"/>
+          </a:solidFill>
+          <a:ln>
+            <a:solidFill>
+              <a:schemeClr val="tx1"/>
+            </a:solidFill>
+          </a:ln>
+        </p:spPr>
+        <p:style>
+          <a:lnRef idx="2">
+            <a:schemeClr val="accent1">
+              <a:shade val="50000"/>
+            </a:schemeClr>
+          </a:lnRef>
+          <a:fillRef idx="1">
+            <a:schemeClr val="accent1"/>
+          </a:fillRef>
+          <a:effectRef idx="0">
+            <a:schemeClr val="accent1"/>
+          </a:effectRef>
+          <a:fontRef idx="minor">
+            <a:schemeClr val="lt1"/>
+          </a:fontRef>
+        </p:style>
+        <p:txBody>
+          <a:bodyPr rtlCol="0" anchor="ctr"/>
+          <a:lstStyle/>
+          <a:p>
+            <a:pPr algn="ctr"/>
+            <a:r>
+              <a:rPr lang="en-PH" dirty="0">
+                <a:solidFill>
+                  <a:schemeClr val="bg1"/>
+                </a:solidFill>
+              </a:rPr>
+              <a:t>  JUSTRENZ 200 Meters</a:t>
+            </a:r>
+          </a:p>
+        </p:txBody>
+      </p:sp>
+      <p:sp>
+        <p:nvSpPr>
+          <p:cNvPr id="51" name="TextBox 50">
+            <a:extLst>
+              <a:ext uri="{FF2B5EF4-FFF2-40B4-BE49-F238E27FC236}">
+                <a16:creationId xmlns:a16="http://schemas.microsoft.com/office/drawing/2014/main" id="{3914EA70-B6A7-4773-A846-FF23815AA96D}"/>
+              </a:ext>
+            </a:extLst>
+          </p:cNvPr>
+          <p:cNvSpPr txBox="1"/>
+          <p:nvPr/>
+        </p:nvSpPr>
+        <p:spPr>
+          <a:xfrm>
+            <a:off x="5105164" y="2658213"/>
+            <a:ext cx="1994456" cy="369332"/>
+          </a:xfrm>
+          <a:prstGeom prst="rect">
+            <a:avLst/>
+          </a:prstGeom>
+          <a:noFill/>
+          <a:ln>
+            <a:solidFill>
+              <a:schemeClr val="tx1"/>
+            </a:solidFill>
+          </a:ln>
+        </p:spPr>
+        <p:txBody>
+          <a:bodyPr wrap="square" rtlCol="0">
+            <a:spAutoFit/>
+          </a:bodyPr>
+          <a:lstStyle/>
+          <a:p>
+            <a:pPr algn="ctr"/>
+            <a:r>
+              <a:rPr lang="en-PH" b="1" dirty="0">
+                <a:latin typeface="Gill Sans MT" panose="020B0502020104020203" pitchFamily="34" charset="0"/>
+              </a:rPr>
+              <a:t>SHOW IN MAP </a:t>
+            </a:r>
+          </a:p>
+        </p:txBody>
+      </p:sp>
+      <p:sp>
+        <p:nvSpPr>
+          <p:cNvPr id="57" name="Arrow: Left 56">
+            <a:extLst>
+              <a:ext uri="{FF2B5EF4-FFF2-40B4-BE49-F238E27FC236}">
+                <a16:creationId xmlns:a16="http://schemas.microsoft.com/office/drawing/2014/main" id="{B0AC02CD-C2FA-4689-94D7-139D1EBD9CAD}"/>
+              </a:ext>
+            </a:extLst>
+          </p:cNvPr>
+          <p:cNvSpPr/>
+          <p:nvPr/>
+        </p:nvSpPr>
+        <p:spPr>
+          <a:xfrm>
+            <a:off x="4639938" y="1190309"/>
+            <a:ext cx="430671" cy="332350"/>
+          </a:xfrm>
+          <a:prstGeom prst="leftArrow">
+            <a:avLst/>
+          </a:prstGeom>
+          <a:solidFill>
+            <a:schemeClr val="bg1"/>
+          </a:solidFill>
+          <a:ln>
+            <a:solidFill>
+              <a:schemeClr val="tx1"/>
+            </a:solidFill>
+          </a:ln>
+        </p:spPr>
+        <p:style>
+          <a:lnRef idx="2">
+            <a:schemeClr val="accent1">
+              <a:shade val="50000"/>
+            </a:schemeClr>
+          </a:lnRef>
+          <a:fillRef idx="1">
+            <a:schemeClr val="accent1"/>
+          </a:fillRef>
+          <a:effectRef idx="0">
+            <a:schemeClr val="accent1"/>
+          </a:effectRef>
+          <a:fontRef idx="minor">
+            <a:schemeClr val="lt1"/>
+          </a:fontRef>
+        </p:style>
+        <p:txBody>
+          <a:bodyPr rtlCol="0" anchor="ctr"/>
+          <a:lstStyle/>
+          <a:p>
+            <a:pPr algn="ctr"/>
+            <a:endParaRPr lang="en-PH"/>
+          </a:p>
+        </p:txBody>
+      </p:sp>
+      <p:sp>
+        <p:nvSpPr>
+          <p:cNvPr id="62" name="Arrow: Left 61">
+            <a:extLst>
+              <a:ext uri="{FF2B5EF4-FFF2-40B4-BE49-F238E27FC236}">
+                <a16:creationId xmlns:a16="http://schemas.microsoft.com/office/drawing/2014/main" id="{0D4BF453-2CF9-4741-AFEF-0D091A6ADEDE}"/>
+              </a:ext>
+            </a:extLst>
+          </p:cNvPr>
+          <p:cNvSpPr/>
+          <p:nvPr/>
+        </p:nvSpPr>
+        <p:spPr>
+          <a:xfrm>
+            <a:off x="8432786" y="1190309"/>
+            <a:ext cx="430671" cy="332350"/>
+          </a:xfrm>
+          <a:prstGeom prst="leftArrow">
+            <a:avLst/>
+          </a:prstGeom>
+          <a:solidFill>
+            <a:schemeClr val="bg1"/>
+          </a:solidFill>
+          <a:ln>
+            <a:solidFill>
+              <a:schemeClr val="tx1"/>
+            </a:solidFill>
+          </a:ln>
+        </p:spPr>
+        <p:style>
+          <a:lnRef idx="2">
+            <a:schemeClr val="accent1">
+              <a:shade val="50000"/>
+            </a:schemeClr>
+          </a:lnRef>
+          <a:fillRef idx="1">
+            <a:schemeClr val="accent1"/>
+          </a:fillRef>
+          <a:effectRef idx="0">
+            <a:schemeClr val="accent1"/>
+          </a:effectRef>
+          <a:fontRef idx="minor">
+            <a:schemeClr val="lt1"/>
+          </a:fontRef>
+        </p:style>
+        <p:txBody>
+          <a:bodyPr rtlCol="0" anchor="ctr"/>
+          <a:lstStyle/>
+          <a:p>
+            <a:pPr algn="ctr"/>
+            <a:endParaRPr lang="en-PH"/>
+          </a:p>
+        </p:txBody>
+      </p:sp>
+      <p:sp>
+        <p:nvSpPr>
+          <p:cNvPr id="63" name="Rectangle 62">
+            <a:extLst>
+              <a:ext uri="{FF2B5EF4-FFF2-40B4-BE49-F238E27FC236}">
+                <a16:creationId xmlns:a16="http://schemas.microsoft.com/office/drawing/2014/main" id="{C2B999E3-4C7E-4178-86C0-BA07492F5FC5}"/>
+              </a:ext>
+            </a:extLst>
+          </p:cNvPr>
+          <p:cNvSpPr/>
+          <p:nvPr/>
+        </p:nvSpPr>
+        <p:spPr>
+          <a:xfrm>
+            <a:off x="1364970" y="3906704"/>
+            <a:ext cx="1381541" cy="493644"/>
+          </a:xfrm>
+          <a:prstGeom prst="rect">
+            <a:avLst/>
+          </a:prstGeom>
+          <a:solidFill>
+            <a:schemeClr val="bg1"/>
+          </a:solidFill>
+        </p:spPr>
+        <p:style>
+          <a:lnRef idx="2">
+            <a:schemeClr val="accent1">
+              <a:shade val="50000"/>
+            </a:schemeClr>
+          </a:lnRef>
+          <a:fillRef idx="1">
+            <a:schemeClr val="accent1"/>
+          </a:fillRef>
+          <a:effectRef idx="0">
+            <a:schemeClr val="accent1"/>
+          </a:effectRef>
+          <a:fontRef idx="minor">
+            <a:schemeClr val="lt1"/>
+          </a:fontRef>
+        </p:style>
+        <p:txBody>
+          <a:bodyPr rtlCol="0" anchor="ctr"/>
+          <a:lstStyle/>
+          <a:p>
+            <a:pPr algn="ctr"/>
+            <a:r>
+              <a:rPr lang="en-PH" dirty="0">
+                <a:solidFill>
+                  <a:schemeClr val="tx1"/>
+                </a:solidFill>
+              </a:rPr>
+              <a:t>Nearest</a:t>
+            </a:r>
+          </a:p>
+        </p:txBody>
+      </p:sp>
+      <p:sp>
+        <p:nvSpPr>
+          <p:cNvPr id="64" name="Rectangle 63">
+            <a:extLst>
+              <a:ext uri="{FF2B5EF4-FFF2-40B4-BE49-F238E27FC236}">
+                <a16:creationId xmlns:a16="http://schemas.microsoft.com/office/drawing/2014/main" id="{11CDB74E-4612-484B-BED7-7DDC5EE71A27}"/>
+              </a:ext>
+            </a:extLst>
+          </p:cNvPr>
+          <p:cNvSpPr/>
+          <p:nvPr/>
+        </p:nvSpPr>
+        <p:spPr>
+          <a:xfrm>
+            <a:off x="4851115" y="3097897"/>
+            <a:ext cx="2459682" cy="493644"/>
+          </a:xfrm>
+          <a:prstGeom prst="rect">
+            <a:avLst/>
+          </a:prstGeom>
+          <a:solidFill>
+            <a:schemeClr val="tx1"/>
+          </a:solidFill>
+          <a:ln>
+            <a:solidFill>
+              <a:schemeClr val="tx1"/>
+            </a:solidFill>
+          </a:ln>
+        </p:spPr>
+        <p:style>
+          <a:lnRef idx="2">
+            <a:schemeClr val="accent1">
+              <a:shade val="50000"/>
+            </a:schemeClr>
+          </a:lnRef>
+          <a:fillRef idx="1">
+            <a:schemeClr val="accent1"/>
+          </a:fillRef>
+          <a:effectRef idx="0">
+            <a:schemeClr val="accent1"/>
+          </a:effectRef>
+          <a:fontRef idx="minor">
+            <a:schemeClr val="lt1"/>
+          </a:fontRef>
+        </p:style>
+        <p:txBody>
+          <a:bodyPr rtlCol="0" anchor="ctr"/>
+          <a:lstStyle/>
+          <a:p>
+            <a:pPr algn="ctr"/>
+            <a:r>
+              <a:rPr lang="en-PH" dirty="0">
+                <a:solidFill>
+                  <a:schemeClr val="bg1"/>
+                </a:solidFill>
+              </a:rPr>
+              <a:t>  ROG 500 Meters</a:t>
+            </a:r>
+          </a:p>
+        </p:txBody>
+      </p:sp>
+      <p:sp>
+        <p:nvSpPr>
+          <p:cNvPr id="65" name="TextBox 64">
+            <a:extLst>
+              <a:ext uri="{FF2B5EF4-FFF2-40B4-BE49-F238E27FC236}">
+                <a16:creationId xmlns:a16="http://schemas.microsoft.com/office/drawing/2014/main" id="{825A416B-3A5F-45FC-B700-3B6293EAE689}"/>
+              </a:ext>
+            </a:extLst>
+          </p:cNvPr>
+          <p:cNvSpPr txBox="1"/>
+          <p:nvPr/>
+        </p:nvSpPr>
+        <p:spPr>
+          <a:xfrm>
+            <a:off x="5123253" y="3674478"/>
+            <a:ext cx="1994456" cy="369332"/>
+          </a:xfrm>
+          <a:prstGeom prst="rect">
+            <a:avLst/>
+          </a:prstGeom>
+          <a:noFill/>
+          <a:ln>
+            <a:solidFill>
+              <a:schemeClr val="tx1"/>
+            </a:solidFill>
+          </a:ln>
+        </p:spPr>
+        <p:txBody>
+          <a:bodyPr wrap="square" rtlCol="0">
+            <a:spAutoFit/>
+          </a:bodyPr>
+          <a:lstStyle/>
+          <a:p>
+            <a:pPr algn="ctr"/>
+            <a:r>
+              <a:rPr lang="en-PH" b="1" dirty="0">
+                <a:latin typeface="Gill Sans MT" panose="020B0502020104020203" pitchFamily="34" charset="0"/>
+              </a:rPr>
+              <a:t>SHOW IN MAP </a:t>
+            </a:r>
+          </a:p>
+        </p:txBody>
+      </p:sp>
+      <p:sp>
+        <p:nvSpPr>
+          <p:cNvPr id="66" name="Rectangle 65">
+            <a:extLst>
+              <a:ext uri="{FF2B5EF4-FFF2-40B4-BE49-F238E27FC236}">
+                <a16:creationId xmlns:a16="http://schemas.microsoft.com/office/drawing/2014/main" id="{4A41B964-41B5-4138-8C8C-56E0A006CF42}"/>
+              </a:ext>
+            </a:extLst>
+          </p:cNvPr>
+          <p:cNvSpPr/>
+          <p:nvPr/>
+        </p:nvSpPr>
+        <p:spPr>
+          <a:xfrm>
+            <a:off x="4848431" y="4153526"/>
+            <a:ext cx="2459682" cy="493644"/>
+          </a:xfrm>
+          <a:prstGeom prst="rect">
+            <a:avLst/>
+          </a:prstGeom>
+          <a:solidFill>
+            <a:schemeClr val="tx1"/>
+          </a:solidFill>
+          <a:ln>
+            <a:solidFill>
+              <a:schemeClr val="tx1"/>
+            </a:solidFill>
+          </a:ln>
+        </p:spPr>
+        <p:style>
+          <a:lnRef idx="2">
+            <a:schemeClr val="accent1">
+              <a:shade val="50000"/>
+            </a:schemeClr>
+          </a:lnRef>
+          <a:fillRef idx="1">
+            <a:schemeClr val="accent1"/>
+          </a:fillRef>
+          <a:effectRef idx="0">
+            <a:schemeClr val="accent1"/>
+          </a:effectRef>
+          <a:fontRef idx="minor">
+            <a:schemeClr val="lt1"/>
+          </a:fontRef>
+        </p:style>
+        <p:txBody>
+          <a:bodyPr rtlCol="0" anchor="ctr"/>
+          <a:lstStyle/>
+          <a:p>
+            <a:pPr algn="ctr"/>
+            <a:r>
+              <a:rPr lang="en-PH" dirty="0">
+                <a:solidFill>
+                  <a:schemeClr val="bg1"/>
+                </a:solidFill>
+              </a:rPr>
+              <a:t>  </a:t>
+            </a:r>
+            <a:r>
+              <a:rPr lang="en-PH">
+                <a:solidFill>
+                  <a:schemeClr val="bg1"/>
+                </a:solidFill>
+              </a:rPr>
+              <a:t>TNC 600 </a:t>
+            </a:r>
+            <a:r>
+              <a:rPr lang="en-PH" dirty="0">
+                <a:solidFill>
+                  <a:schemeClr val="bg1"/>
+                </a:solidFill>
+              </a:rPr>
+              <a:t>Meters</a:t>
+            </a:r>
+          </a:p>
+        </p:txBody>
+      </p:sp>
+      <p:sp>
+        <p:nvSpPr>
+          <p:cNvPr id="67" name="TextBox 66">
+            <a:extLst>
+              <a:ext uri="{FF2B5EF4-FFF2-40B4-BE49-F238E27FC236}">
+                <a16:creationId xmlns:a16="http://schemas.microsoft.com/office/drawing/2014/main" id="{49BD507F-E7A4-4BE2-BFA9-DB6B869F5AA4}"/>
+              </a:ext>
+            </a:extLst>
+          </p:cNvPr>
+          <p:cNvSpPr txBox="1"/>
+          <p:nvPr/>
+        </p:nvSpPr>
+        <p:spPr>
+          <a:xfrm>
+            <a:off x="5120569" y="4730107"/>
+            <a:ext cx="1994456" cy="369332"/>
+          </a:xfrm>
+          <a:prstGeom prst="rect">
+            <a:avLst/>
+          </a:prstGeom>
+          <a:noFill/>
+          <a:ln>
+            <a:solidFill>
+              <a:schemeClr val="tx1"/>
+            </a:solidFill>
+          </a:ln>
+        </p:spPr>
+        <p:txBody>
+          <a:bodyPr wrap="square" rtlCol="0">
+            <a:spAutoFit/>
+          </a:bodyPr>
+          <a:lstStyle/>
+          <a:p>
+            <a:pPr algn="ctr"/>
+            <a:r>
+              <a:rPr lang="en-PH" b="1" dirty="0">
+                <a:latin typeface="Gill Sans MT" panose="020B0502020104020203" pitchFamily="34" charset="0"/>
+              </a:rPr>
+              <a:t>SHOW IN MAP </a:t>
+            </a:r>
+          </a:p>
+        </p:txBody>
+      </p:sp>
+      <p:pic>
+        <p:nvPicPr>
+          <p:cNvPr id="43" name="Picture 42">
+            <a:extLst>
+              <a:ext uri="{FF2B5EF4-FFF2-40B4-BE49-F238E27FC236}">
+                <a16:creationId xmlns:a16="http://schemas.microsoft.com/office/drawing/2014/main" id="{7E4B440E-C9CE-40B1-8FA9-546DC6DC2EFA}"/>
+              </a:ext>
+            </a:extLst>
+          </p:cNvPr>
+          <p:cNvPicPr>
+            <a:picLocks noChangeAspect="1"/>
+          </p:cNvPicPr>
+          <p:nvPr/>
+        </p:nvPicPr>
+        <p:blipFill>
+          <a:blip r:embed="rId2"/>
+          <a:stretch>
+            <a:fillRect/>
+          </a:stretch>
+        </p:blipFill>
+        <p:spPr>
+          <a:xfrm>
+            <a:off x="8616185" y="1588202"/>
+            <a:ext cx="2566374" cy="3511237"/>
+          </a:xfrm>
+          <a:prstGeom prst="rect">
+            <a:avLst/>
+          </a:prstGeom>
+        </p:spPr>
+      </p:pic>
+      <p:sp>
+        <p:nvSpPr>
+          <p:cNvPr id="44" name="TextBox 43">
+            <a:extLst>
+              <a:ext uri="{FF2B5EF4-FFF2-40B4-BE49-F238E27FC236}">
+                <a16:creationId xmlns:a16="http://schemas.microsoft.com/office/drawing/2014/main" id="{B3A9B6FE-90F8-49D6-98AA-43E7924C5091}"/>
+              </a:ext>
+            </a:extLst>
+          </p:cNvPr>
+          <p:cNvSpPr txBox="1"/>
+          <p:nvPr/>
+        </p:nvSpPr>
+        <p:spPr>
+          <a:xfrm>
+            <a:off x="9110868" y="1186667"/>
+            <a:ext cx="1577009" cy="369332"/>
+          </a:xfrm>
+          <a:prstGeom prst="rect">
+            <a:avLst/>
+          </a:prstGeom>
+          <a:noFill/>
+        </p:spPr>
+        <p:txBody>
+          <a:bodyPr wrap="square" rtlCol="0">
+            <a:spAutoFit/>
+          </a:bodyPr>
+          <a:lstStyle/>
+          <a:p>
+            <a:pPr algn="ctr"/>
+            <a:r>
+              <a:rPr lang="en-PH" b="1" dirty="0">
+                <a:latin typeface="Gill Sans MT" panose="020B0502020104020203" pitchFamily="34" charset="0"/>
+              </a:rPr>
+              <a:t>ROG</a:t>
+            </a:r>
+          </a:p>
+        </p:txBody>
+      </p:sp>
+      <p:sp>
+        <p:nvSpPr>
+          <p:cNvPr id="71" name="Rectangle 70">
+            <a:extLst>
+              <a:ext uri="{FF2B5EF4-FFF2-40B4-BE49-F238E27FC236}">
+                <a16:creationId xmlns:a16="http://schemas.microsoft.com/office/drawing/2014/main" id="{980DBF87-7394-41BB-ACCB-52578386B5B3}"/>
+              </a:ext>
+            </a:extLst>
+          </p:cNvPr>
+          <p:cNvSpPr/>
+          <p:nvPr/>
+        </p:nvSpPr>
+        <p:spPr>
+          <a:xfrm>
+            <a:off x="1373479" y="5021140"/>
+            <a:ext cx="1381540" cy="493644"/>
+          </a:xfrm>
+          <a:prstGeom prst="rect">
+            <a:avLst/>
+          </a:prstGeom>
+          <a:solidFill>
+            <a:schemeClr val="bg1"/>
+          </a:solidFill>
+          <a:ln>
+            <a:solidFill>
+              <a:schemeClr val="tx1"/>
+            </a:solidFill>
+          </a:ln>
+        </p:spPr>
+        <p:style>
+          <a:lnRef idx="2">
+            <a:schemeClr val="accent1">
+              <a:shade val="50000"/>
+            </a:schemeClr>
+          </a:lnRef>
+          <a:fillRef idx="1">
+            <a:schemeClr val="accent1"/>
+          </a:fillRef>
+          <a:effectRef idx="0">
+            <a:schemeClr val="accent1"/>
+          </a:effectRef>
+          <a:fontRef idx="minor">
+            <a:schemeClr val="lt1"/>
+          </a:fontRef>
+        </p:style>
+        <p:txBody>
+          <a:bodyPr rtlCol="0" anchor="ctr"/>
+          <a:lstStyle/>
+          <a:p>
+            <a:pPr algn="ctr"/>
+            <a:r>
+              <a:rPr lang="en-PH" dirty="0">
+                <a:solidFill>
+                  <a:schemeClr val="tx1"/>
+                </a:solidFill>
+              </a:rPr>
+              <a:t>PC QUALITY</a:t>
+            </a:r>
+          </a:p>
+        </p:txBody>
+      </p:sp>
+      <p:sp>
+        <p:nvSpPr>
+          <p:cNvPr id="72" name="TextBox 71">
+            <a:extLst>
+              <a:ext uri="{FF2B5EF4-FFF2-40B4-BE49-F238E27FC236}">
+                <a16:creationId xmlns:a16="http://schemas.microsoft.com/office/drawing/2014/main" id="{36BD9C0D-9F0B-4671-A9A5-03B712693801}"/>
+              </a:ext>
+            </a:extLst>
+          </p:cNvPr>
+          <p:cNvSpPr txBox="1"/>
+          <p:nvPr/>
+        </p:nvSpPr>
+        <p:spPr>
+          <a:xfrm>
+            <a:off x="8779327" y="5157778"/>
+            <a:ext cx="2266594" cy="646331"/>
+          </a:xfrm>
+          <a:prstGeom prst="rect">
+            <a:avLst/>
+          </a:prstGeom>
+          <a:noFill/>
+          <a:ln>
+            <a:solidFill>
+              <a:schemeClr val="tx1"/>
+            </a:solidFill>
+          </a:ln>
+        </p:spPr>
+        <p:txBody>
+          <a:bodyPr wrap="square" rtlCol="0">
+            <a:spAutoFit/>
+          </a:bodyPr>
+          <a:lstStyle/>
+          <a:p>
+            <a:pPr algn="ctr"/>
+            <a:r>
+              <a:rPr lang="en-PH" sz="1200" b="1" dirty="0">
+                <a:latin typeface="Gill Sans MT" panose="020B0502020104020203" pitchFamily="34" charset="0"/>
+              </a:rPr>
+              <a:t>LOW PC – 13PHP HR </a:t>
+            </a:r>
+          </a:p>
+          <a:p>
+            <a:pPr algn="ctr"/>
+            <a:r>
+              <a:rPr lang="en-PH" sz="1200" b="1" dirty="0">
+                <a:latin typeface="Gill Sans MT" panose="020B0502020104020203" pitchFamily="34" charset="0"/>
+              </a:rPr>
+              <a:t>MID PC- 25 PHP HR</a:t>
+            </a:r>
+          </a:p>
+          <a:p>
+            <a:pPr algn="ctr"/>
+            <a:r>
+              <a:rPr lang="en-PH" sz="1200" b="1" dirty="0">
+                <a:latin typeface="Gill Sans MT" panose="020B0502020104020203" pitchFamily="34" charset="0"/>
+              </a:rPr>
+              <a:t>HIGH PC – 30PHP HR</a:t>
+            </a:r>
+          </a:p>
+        </p:txBody>
+      </p:sp>
+    </p:spTree>
+    <p:extLst>
+      <p:ext uri="{BB962C8B-B14F-4D97-AF65-F5344CB8AC3E}">
+        <p14:creationId xmlns:p14="http://schemas.microsoft.com/office/powerpoint/2010/main" val="1226772311"/>
+      </p:ext>
+    </p:extLst>
+  </p:cSld>
+  <p:clrMapOvr>
+    <a:masterClrMapping/>
+  </p:clrMapOvr>
+</p:sld>
+</file>
+
+<file path=ppt/slides/slide11.xml><?xml version="1.0" encoding="utf-8"?>
+<p:sld xmlns:a="http://schemas.openxmlformats.org/drawingml/2006/main" xmlns:r="http://schemas.openxmlformats.org/officeDocument/2006/relationships" xmlns:p="http://schemas.openxmlformats.org/presentationml/2006/main">
+  <p:cSld>
+    <p:spTree>
+      <p:nvGrpSpPr>
+        <p:cNvPr id="1" name=""/>
+        <p:cNvGrpSpPr/>
+        <p:nvPr/>
+      </p:nvGrpSpPr>
+      <p:grpSpPr>
+        <a:xfrm>
+          <a:off x="0" y="0"/>
+          <a:ext cx="0" cy="0"/>
+          <a:chOff x="0" y="0"/>
+          <a:chExt cx="0" cy="0"/>
+        </a:xfrm>
+      </p:grpSpPr>
+      <p:grpSp>
+        <p:nvGrpSpPr>
           <p:cNvPr id="14" name="Group 13">
             <a:extLst>
               <a:ext uri="{FF2B5EF4-FFF2-40B4-BE49-F238E27FC236}">
@@ -4984,7 +6465,7 @@
 </p:sld>
 </file>
 
-<file path=ppt/slides/slide11.xml><?xml version="1.0" encoding="utf-8"?>
+<file path=ppt/slides/slide12.xml><?xml version="1.0" encoding="utf-8"?>
 <p:sld xmlns:a="http://schemas.openxmlformats.org/drawingml/2006/main" xmlns:r="http://schemas.openxmlformats.org/officeDocument/2006/relationships" xmlns:p="http://schemas.openxmlformats.org/presentationml/2006/main">
   <p:cSld>
     <p:spTree>
@@ -5674,7 +7155,7 @@
 </p:sld>
 </file>
 
-<file path=ppt/slides/slide12.xml><?xml version="1.0" encoding="utf-8"?>
+<file path=ppt/slides/slide13.xml><?xml version="1.0" encoding="utf-8"?>
 <p:sld xmlns:a="http://schemas.openxmlformats.org/drawingml/2006/main" xmlns:r="http://schemas.openxmlformats.org/officeDocument/2006/relationships" xmlns:p="http://schemas.openxmlformats.org/presentationml/2006/main">
   <p:cSld>
     <p:spTree>
@@ -12459,7 +13940,7 @@
 </p:sld>
 </file>
 
-<file path=ppt/slides/slide13.xml><?xml version="1.0" encoding="utf-8"?>
+<file path=ppt/slides/slide14.xml><?xml version="1.0" encoding="utf-8"?>
 <p:sld xmlns:a="http://schemas.openxmlformats.org/drawingml/2006/main" xmlns:r="http://schemas.openxmlformats.org/officeDocument/2006/relationships" xmlns:p="http://schemas.openxmlformats.org/presentationml/2006/main">
   <p:cSld>
     <p:spTree>
@@ -13190,7 +14671,328 @@
 </p:sld>
 </file>
 
-<file path=ppt/slides/slide14.xml><?xml version="1.0" encoding="utf-8"?>
+<file path=ppt/slides/slide15.xml><?xml version="1.0" encoding="utf-8"?>
+<p:sld xmlns:a="http://schemas.openxmlformats.org/drawingml/2006/main" xmlns:r="http://schemas.openxmlformats.org/officeDocument/2006/relationships" xmlns:p="http://schemas.openxmlformats.org/presentationml/2006/main">
+  <p:cSld>
+    <p:spTree>
+      <p:nvGrpSpPr>
+        <p:cNvPr id="1" name=""/>
+        <p:cNvGrpSpPr/>
+        <p:nvPr/>
+      </p:nvGrpSpPr>
+      <p:grpSpPr>
+        <a:xfrm>
+          <a:off x="0" y="0"/>
+          <a:ext cx="0" cy="0"/>
+          <a:chOff x="0" y="0"/>
+          <a:chExt cx="0" cy="0"/>
+        </a:xfrm>
+      </p:grpSpPr>
+      <p:sp>
+        <p:nvSpPr>
+          <p:cNvPr id="2" name="TextBox 1">
+            <a:extLst>
+              <a:ext uri="{FF2B5EF4-FFF2-40B4-BE49-F238E27FC236}">
+                <a16:creationId xmlns:a16="http://schemas.microsoft.com/office/drawing/2014/main" id="{516FA38D-E8F4-48A3-9D51-C235014C6AD7}"/>
+              </a:ext>
+            </a:extLst>
+          </p:cNvPr>
+          <p:cNvSpPr txBox="1"/>
+          <p:nvPr/>
+        </p:nvSpPr>
+        <p:spPr>
+          <a:xfrm>
+            <a:off x="508000" y="972457"/>
+            <a:ext cx="8786312" cy="769441"/>
+          </a:xfrm>
+          <a:prstGeom prst="rect">
+            <a:avLst/>
+          </a:prstGeom>
+          <a:noFill/>
+        </p:spPr>
+        <p:txBody>
+          <a:bodyPr wrap="square" rtlCol="0">
+            <a:spAutoFit/>
+          </a:bodyPr>
+          <a:lstStyle/>
+          <a:p>
+            <a:r>
+              <a:rPr lang="en-PH" sz="4400" b="1" dirty="0"/>
+              <a:t>User Feedback (First Prototype)</a:t>
+            </a:r>
+          </a:p>
+        </p:txBody>
+      </p:sp>
+      <p:sp>
+        <p:nvSpPr>
+          <p:cNvPr id="10" name="Rectangle 9">
+            <a:extLst>
+              <a:ext uri="{FF2B5EF4-FFF2-40B4-BE49-F238E27FC236}">
+                <a16:creationId xmlns:a16="http://schemas.microsoft.com/office/drawing/2014/main" id="{5316A900-6D0D-4779-B86F-C134F5DE456C}"/>
+              </a:ext>
+            </a:extLst>
+          </p:cNvPr>
+          <p:cNvSpPr/>
+          <p:nvPr/>
+        </p:nvSpPr>
+        <p:spPr>
+          <a:xfrm>
+            <a:off x="508000" y="1971902"/>
+            <a:ext cx="10724776" cy="3109056"/>
+          </a:xfrm>
+          <a:prstGeom prst="rect">
+            <a:avLst/>
+          </a:prstGeom>
+        </p:spPr>
+        <p:txBody>
+          <a:bodyPr wrap="square">
+            <a:spAutoFit/>
+          </a:bodyPr>
+          <a:lstStyle/>
+          <a:p>
+            <a:pPr marL="342900" lvl="0" indent="-342900">
+              <a:lnSpc>
+                <a:spcPct val="150000"/>
+              </a:lnSpc>
+              <a:spcAft>
+                <a:spcPts val="800"/>
+              </a:spcAft>
+              <a:buFont typeface="Symbol" panose="05050102010706020507" pitchFamily="18" charset="2"/>
+              <a:buChar char=""/>
+            </a:pPr>
+            <a:r>
+              <a:rPr lang="en-PH" sz="2400" dirty="0">
+                <a:effectLst/>
+                <a:latin typeface="Tahoma" panose="020B0604030504040204" pitchFamily="34" charset="0"/>
+                <a:ea typeface="Times New Roman" panose="02020603050405020304" pitchFamily="18" charset="0"/>
+                <a:cs typeface="Times New Roman" panose="02020603050405020304" pitchFamily="18" charset="0"/>
+              </a:rPr>
+              <a:t>Prototype has no pictures</a:t>
+            </a:r>
+          </a:p>
+          <a:p>
+            <a:pPr marL="342900" lvl="0" indent="-342900">
+              <a:lnSpc>
+                <a:spcPct val="150000"/>
+              </a:lnSpc>
+              <a:spcAft>
+                <a:spcPts val="800"/>
+              </a:spcAft>
+              <a:buFont typeface="Symbol" panose="05050102010706020507" pitchFamily="18" charset="2"/>
+              <a:buChar char=""/>
+            </a:pPr>
+            <a:r>
+              <a:rPr lang="en-PH" sz="2400" dirty="0">
+                <a:latin typeface="Tahoma" panose="020B0604030504040204" pitchFamily="34" charset="0"/>
+                <a:ea typeface="Times New Roman" panose="02020603050405020304" pitchFamily="18" charset="0"/>
+                <a:cs typeface="Times New Roman" panose="02020603050405020304" pitchFamily="18" charset="0"/>
+              </a:rPr>
+              <a:t>Unresponsive Map</a:t>
+            </a:r>
+          </a:p>
+          <a:p>
+            <a:pPr marL="342900" lvl="0" indent="-342900">
+              <a:lnSpc>
+                <a:spcPct val="150000"/>
+              </a:lnSpc>
+              <a:spcAft>
+                <a:spcPts val="800"/>
+              </a:spcAft>
+              <a:buFont typeface="Symbol" panose="05050102010706020507" pitchFamily="18" charset="2"/>
+              <a:buChar char=""/>
+            </a:pPr>
+            <a:r>
+              <a:rPr lang="en-PH" sz="2400" dirty="0">
+                <a:effectLst/>
+                <a:latin typeface="Tahoma" panose="020B0604030504040204" pitchFamily="34" charset="0"/>
+                <a:ea typeface="Times New Roman" panose="02020603050405020304" pitchFamily="18" charset="0"/>
+                <a:cs typeface="Times New Roman" panose="02020603050405020304" pitchFamily="18" charset="0"/>
+              </a:rPr>
+              <a:t>Provide current reviews of the Internet Cafes, also let the users comment, or do a review about the place.</a:t>
+            </a:r>
+          </a:p>
+          <a:p>
+            <a:pPr marL="342900" lvl="0" indent="-342900">
+              <a:lnSpc>
+                <a:spcPct val="150000"/>
+              </a:lnSpc>
+              <a:spcAft>
+                <a:spcPts val="800"/>
+              </a:spcAft>
+              <a:buFont typeface="Symbol" panose="05050102010706020507" pitchFamily="18" charset="2"/>
+              <a:buChar char=""/>
+            </a:pPr>
+            <a:r>
+              <a:rPr lang="en-PH" sz="2400" dirty="0">
+                <a:effectLst/>
+                <a:latin typeface="Tahoma" panose="020B0604030504040204" pitchFamily="34" charset="0"/>
+                <a:ea typeface="Times New Roman" panose="02020603050405020304" pitchFamily="18" charset="0"/>
+                <a:cs typeface="Times New Roman" panose="02020603050405020304" pitchFamily="18" charset="0"/>
+              </a:rPr>
+              <a:t>Create an advanced booking system</a:t>
+            </a:r>
+            <a:endParaRPr lang="en-PH" sz="2000" dirty="0">
+              <a:effectLst/>
+              <a:latin typeface="Calibri" panose="020F0502020204030204" pitchFamily="34" charset="0"/>
+              <a:ea typeface="Times New Roman" panose="02020603050405020304" pitchFamily="18" charset="0"/>
+              <a:cs typeface="Times New Roman" panose="02020603050405020304" pitchFamily="18" charset="0"/>
+            </a:endParaRPr>
+          </a:p>
+        </p:txBody>
+      </p:sp>
+    </p:spTree>
+    <p:extLst>
+      <p:ext uri="{BB962C8B-B14F-4D97-AF65-F5344CB8AC3E}">
+        <p14:creationId xmlns:p14="http://schemas.microsoft.com/office/powerpoint/2010/main" val="3827903759"/>
+      </p:ext>
+    </p:extLst>
+  </p:cSld>
+  <p:clrMapOvr>
+    <a:masterClrMapping/>
+  </p:clrMapOvr>
+</p:sld>
+</file>
+
+<file path=ppt/slides/slide16.xml><?xml version="1.0" encoding="utf-8"?>
+<p:sld xmlns:a="http://schemas.openxmlformats.org/drawingml/2006/main" xmlns:r="http://schemas.openxmlformats.org/officeDocument/2006/relationships" xmlns:p="http://schemas.openxmlformats.org/presentationml/2006/main">
+  <p:cSld>
+    <p:spTree>
+      <p:nvGrpSpPr>
+        <p:cNvPr id="1" name=""/>
+        <p:cNvGrpSpPr/>
+        <p:nvPr/>
+      </p:nvGrpSpPr>
+      <p:grpSpPr>
+        <a:xfrm>
+          <a:off x="0" y="0"/>
+          <a:ext cx="0" cy="0"/>
+          <a:chOff x="0" y="0"/>
+          <a:chExt cx="0" cy="0"/>
+        </a:xfrm>
+      </p:grpSpPr>
+      <p:sp>
+        <p:nvSpPr>
+          <p:cNvPr id="2" name="TextBox 1">
+            <a:extLst>
+              <a:ext uri="{FF2B5EF4-FFF2-40B4-BE49-F238E27FC236}">
+                <a16:creationId xmlns:a16="http://schemas.microsoft.com/office/drawing/2014/main" id="{516FA38D-E8F4-48A3-9D51-C235014C6AD7}"/>
+              </a:ext>
+            </a:extLst>
+          </p:cNvPr>
+          <p:cNvSpPr txBox="1"/>
+          <p:nvPr/>
+        </p:nvSpPr>
+        <p:spPr>
+          <a:xfrm>
+            <a:off x="508000" y="972457"/>
+            <a:ext cx="8786312" cy="769441"/>
+          </a:xfrm>
+          <a:prstGeom prst="rect">
+            <a:avLst/>
+          </a:prstGeom>
+          <a:noFill/>
+        </p:spPr>
+        <p:txBody>
+          <a:bodyPr wrap="square" rtlCol="0">
+            <a:spAutoFit/>
+          </a:bodyPr>
+          <a:lstStyle/>
+          <a:p>
+            <a:r>
+              <a:rPr lang="en-PH" sz="4400" b="1" dirty="0"/>
+              <a:t>User Feedback (Second Prototype)</a:t>
+            </a:r>
+          </a:p>
+        </p:txBody>
+      </p:sp>
+      <p:sp>
+        <p:nvSpPr>
+          <p:cNvPr id="10" name="Rectangle 9">
+            <a:extLst>
+              <a:ext uri="{FF2B5EF4-FFF2-40B4-BE49-F238E27FC236}">
+                <a16:creationId xmlns:a16="http://schemas.microsoft.com/office/drawing/2014/main" id="{5316A900-6D0D-4779-B86F-C134F5DE456C}"/>
+              </a:ext>
+            </a:extLst>
+          </p:cNvPr>
+          <p:cNvSpPr/>
+          <p:nvPr/>
+        </p:nvSpPr>
+        <p:spPr>
+          <a:xfrm>
+            <a:off x="508000" y="1971902"/>
+            <a:ext cx="10724776" cy="1227580"/>
+          </a:xfrm>
+          <a:prstGeom prst="rect">
+            <a:avLst/>
+          </a:prstGeom>
+        </p:spPr>
+        <p:txBody>
+          <a:bodyPr wrap="square">
+            <a:spAutoFit/>
+          </a:bodyPr>
+          <a:lstStyle/>
+          <a:p>
+            <a:pPr marL="342900" lvl="0" indent="-342900">
+              <a:lnSpc>
+                <a:spcPct val="150000"/>
+              </a:lnSpc>
+              <a:spcAft>
+                <a:spcPts val="800"/>
+              </a:spcAft>
+              <a:buFont typeface="Symbol" panose="05050102010706020507" pitchFamily="18" charset="2"/>
+              <a:buChar char=""/>
+            </a:pPr>
+            <a:r>
+              <a:rPr lang="en-PH" sz="2400" dirty="0">
+                <a:latin typeface="Tahoma" panose="020B0604030504040204" pitchFamily="34" charset="0"/>
+                <a:ea typeface="Times New Roman" panose="02020603050405020304" pitchFamily="18" charset="0"/>
+                <a:cs typeface="Times New Roman" panose="02020603050405020304" pitchFamily="18" charset="0"/>
+              </a:rPr>
+              <a:t>Provide the total price</a:t>
+            </a:r>
+            <a:endParaRPr lang="en-PH" sz="2400" dirty="0">
+              <a:effectLst/>
+              <a:latin typeface="Tahoma" panose="020B0604030504040204" pitchFamily="34" charset="0"/>
+              <a:ea typeface="Times New Roman" panose="02020603050405020304" pitchFamily="18" charset="0"/>
+              <a:cs typeface="Times New Roman" panose="02020603050405020304" pitchFamily="18" charset="0"/>
+            </a:endParaRPr>
+          </a:p>
+          <a:p>
+            <a:pPr marL="342900" lvl="0" indent="-342900">
+              <a:lnSpc>
+                <a:spcPct val="150000"/>
+              </a:lnSpc>
+              <a:spcAft>
+                <a:spcPts val="800"/>
+              </a:spcAft>
+              <a:buFont typeface="Symbol" panose="05050102010706020507" pitchFamily="18" charset="2"/>
+              <a:buChar char=""/>
+            </a:pPr>
+            <a:r>
+              <a:rPr lang="en-PH" sz="2400" dirty="0">
+                <a:latin typeface="Tahoma" panose="020B0604030504040204" pitchFamily="34" charset="0"/>
+                <a:ea typeface="Times New Roman" panose="02020603050405020304" pitchFamily="18" charset="0"/>
+                <a:cs typeface="Times New Roman" panose="02020603050405020304" pitchFamily="18" charset="0"/>
+              </a:rPr>
+              <a:t>Create hints or clues for the users to have an idea how the interface works</a:t>
+            </a:r>
+          </a:p>
+        </p:txBody>
+      </p:sp>
+    </p:spTree>
+    <p:extLst>
+      <p:ext uri="{BB962C8B-B14F-4D97-AF65-F5344CB8AC3E}">
+        <p14:creationId xmlns:p14="http://schemas.microsoft.com/office/powerpoint/2010/main" val="1371761343"/>
+      </p:ext>
+    </p:extLst>
+  </p:cSld>
+  <p:clrMapOvr>
+    <a:masterClrMapping/>
+  </p:clrMapOvr>
+</p:sld>
+</file>
+
+<file path=ppt/slides/slide17.xml><?xml version="1.0" encoding="utf-8"?>
 <p:sld xmlns:a="http://schemas.openxmlformats.org/drawingml/2006/main" xmlns:r="http://schemas.openxmlformats.org/officeDocument/2006/relationships" xmlns:p="http://schemas.openxmlformats.org/presentationml/2006/main">
   <p:cSld>
     <p:spTree>
@@ -13817,7 +15619,7 @@
           <p:cNvPr id="2" name="TextBox 1">
             <a:extLst>
               <a:ext uri="{FF2B5EF4-FFF2-40B4-BE49-F238E27FC236}">
-                <a16:creationId xmlns:a16="http://schemas.microsoft.com/office/drawing/2014/main" id="{6805BCAE-0CD9-4EB5-98C3-81A995CD53F0}"/>
+                <a16:creationId xmlns:a16="http://schemas.microsoft.com/office/drawing/2014/main" id="{516FA38D-E8F4-48A3-9D51-C235014C6AD7}"/>
               </a:ext>
             </a:extLst>
           </p:cNvPr>
@@ -13826,8 +15628,8 @@
         </p:nvSpPr>
         <p:spPr>
           <a:xfrm>
-            <a:off x="333829" y="377371"/>
-            <a:ext cx="6066971" cy="923330"/>
+            <a:off x="508000" y="972457"/>
+            <a:ext cx="5588000" cy="769441"/>
           </a:xfrm>
           <a:prstGeom prst="rect">
             <a:avLst/>
@@ -13841,124 +15643,169 @@
           <a:lstStyle/>
           <a:p>
             <a:r>
-              <a:rPr lang="en-PH" sz="5400" b="1" dirty="0"/>
-              <a:t>STORYBOARD</a:t>
-            </a:r>
-          </a:p>
-        </p:txBody>
-      </p:sp>
-      <p:pic>
-        <p:nvPicPr>
-          <p:cNvPr id="4" name="Picture 3" descr="A close up of text on a white background&#10;&#10;Description automatically generated">
-            <a:extLst>
-              <a:ext uri="{FF2B5EF4-FFF2-40B4-BE49-F238E27FC236}">
-                <a16:creationId xmlns:a16="http://schemas.microsoft.com/office/drawing/2014/main" id="{80B8D095-BA4A-44B4-B155-3BAB68357912}"/>
-              </a:ext>
-            </a:extLst>
-          </p:cNvPr>
-          <p:cNvPicPr>
-            <a:picLocks noChangeAspect="1"/>
-          </p:cNvPicPr>
-          <p:nvPr/>
-        </p:nvPicPr>
-        <p:blipFill>
-          <a:blip r:embed="rId2">
-            <a:extLst>
-              <a:ext uri="{28A0092B-C50C-407E-A947-70E740481C1C}">
-                <a14:useLocalDpi xmlns:a14="http://schemas.microsoft.com/office/drawing/2010/main" val="0"/>
-              </a:ext>
-            </a:extLst>
-          </a:blip>
-          <a:stretch>
-            <a:fillRect/>
-          </a:stretch>
-        </p:blipFill>
-        <p:spPr>
-          <a:xfrm>
-            <a:off x="1062942" y="1402301"/>
-            <a:ext cx="2402783" cy="5078328"/>
-          </a:xfrm>
-          <a:prstGeom prst="rect">
-            <a:avLst/>
-          </a:prstGeom>
-        </p:spPr>
-      </p:pic>
-      <p:pic>
-        <p:nvPicPr>
-          <p:cNvPr id="7" name="Picture 6" descr="A close up of text on a white background&#10;&#10;Description automatically generated">
-            <a:extLst>
-              <a:ext uri="{FF2B5EF4-FFF2-40B4-BE49-F238E27FC236}">
-                <a16:creationId xmlns:a16="http://schemas.microsoft.com/office/drawing/2014/main" id="{CBE8E101-F4DF-4E88-A8CD-A65FAB9622F7}"/>
-              </a:ext>
-            </a:extLst>
-          </p:cNvPr>
-          <p:cNvPicPr>
-            <a:picLocks noChangeAspect="1"/>
-          </p:cNvPicPr>
-          <p:nvPr/>
-        </p:nvPicPr>
-        <p:blipFill>
-          <a:blip r:embed="rId3">
-            <a:extLst>
-              <a:ext uri="{28A0092B-C50C-407E-A947-70E740481C1C}">
-                <a14:useLocalDpi xmlns:a14="http://schemas.microsoft.com/office/drawing/2010/main" val="0"/>
-              </a:ext>
-            </a:extLst>
-          </a:blip>
-          <a:stretch>
-            <a:fillRect/>
-          </a:stretch>
-        </p:blipFill>
-        <p:spPr>
-          <a:xfrm>
-            <a:off x="4999555" y="1402301"/>
-            <a:ext cx="2402783" cy="5078328"/>
-          </a:xfrm>
-          <a:prstGeom prst="rect">
-            <a:avLst/>
-          </a:prstGeom>
-        </p:spPr>
-      </p:pic>
-      <p:pic>
-        <p:nvPicPr>
-          <p:cNvPr id="9" name="Picture 8" descr="A close up of text on a white background&#10;&#10;Description automatically generated">
-            <a:extLst>
-              <a:ext uri="{FF2B5EF4-FFF2-40B4-BE49-F238E27FC236}">
-                <a16:creationId xmlns:a16="http://schemas.microsoft.com/office/drawing/2014/main" id="{E5E832F6-51DD-4CB2-9F3F-92E95113F4B7}"/>
-              </a:ext>
-            </a:extLst>
-          </p:cNvPr>
-          <p:cNvPicPr>
-            <a:picLocks noChangeAspect="1"/>
-          </p:cNvPicPr>
-          <p:nvPr/>
-        </p:nvPicPr>
-        <p:blipFill>
-          <a:blip r:embed="rId4">
-            <a:extLst>
-              <a:ext uri="{28A0092B-C50C-407E-A947-70E740481C1C}">
-                <a14:useLocalDpi xmlns:a14="http://schemas.microsoft.com/office/drawing/2010/main" val="0"/>
-              </a:ext>
-            </a:extLst>
-          </a:blip>
-          <a:stretch>
-            <a:fillRect/>
-          </a:stretch>
-        </p:blipFill>
-        <p:spPr>
-          <a:xfrm>
-            <a:off x="9037768" y="1402301"/>
-            <a:ext cx="2402783" cy="5078328"/>
-          </a:xfrm>
-          <a:prstGeom prst="rect">
-            <a:avLst/>
-          </a:prstGeom>
-        </p:spPr>
-      </p:pic>
+              <a:rPr lang="en-PH" sz="4400" b="1" dirty="0"/>
+              <a:t>Point of View</a:t>
+            </a:r>
+          </a:p>
+        </p:txBody>
+      </p:sp>
+      <p:sp>
+        <p:nvSpPr>
+          <p:cNvPr id="10" name="Rectangle 9">
+            <a:extLst>
+              <a:ext uri="{FF2B5EF4-FFF2-40B4-BE49-F238E27FC236}">
+                <a16:creationId xmlns:a16="http://schemas.microsoft.com/office/drawing/2014/main" id="{5316A900-6D0D-4779-B86F-C134F5DE456C}"/>
+              </a:ext>
+            </a:extLst>
+          </p:cNvPr>
+          <p:cNvSpPr/>
+          <p:nvPr/>
+        </p:nvSpPr>
+        <p:spPr>
+          <a:xfrm>
+            <a:off x="508000" y="1971902"/>
+            <a:ext cx="10724776" cy="4365747"/>
+          </a:xfrm>
+          <a:prstGeom prst="rect">
+            <a:avLst/>
+          </a:prstGeom>
+        </p:spPr>
+        <p:txBody>
+          <a:bodyPr wrap="square">
+            <a:spAutoFit/>
+          </a:bodyPr>
+          <a:lstStyle/>
+          <a:p>
+            <a:pPr marL="342900" lvl="0" indent="-342900">
+              <a:lnSpc>
+                <a:spcPct val="150000"/>
+              </a:lnSpc>
+              <a:spcAft>
+                <a:spcPts val="800"/>
+              </a:spcAft>
+              <a:buFont typeface="Symbol" panose="05050102010706020507" pitchFamily="18" charset="2"/>
+              <a:buChar char=""/>
+            </a:pPr>
+            <a:r>
+              <a:rPr lang="en-PH" sz="2000" dirty="0">
+                <a:latin typeface="Tahoma" panose="020B0604030504040204" pitchFamily="34" charset="0"/>
+                <a:ea typeface="Times New Roman" panose="02020603050405020304" pitchFamily="18" charset="0"/>
+                <a:cs typeface="Times New Roman" panose="02020603050405020304" pitchFamily="18" charset="0"/>
+              </a:rPr>
+              <a:t>Users prefer cheaper rent prizes than expensive ones especially when there is no need for longer use of computers</a:t>
+            </a:r>
+            <a:br>
+              <a:rPr lang="en-PH" sz="2000" dirty="0">
+                <a:latin typeface="Tahoma" panose="020B0604030504040204" pitchFamily="34" charset="0"/>
+                <a:ea typeface="Times New Roman" panose="02020603050405020304" pitchFamily="18" charset="0"/>
+                <a:cs typeface="Times New Roman" panose="02020603050405020304" pitchFamily="18" charset="0"/>
+              </a:rPr>
+            </a:br>
+            <a:endParaRPr lang="en-PH" dirty="0">
+              <a:effectLst/>
+              <a:latin typeface="Calibri" panose="020F0502020204030204" pitchFamily="34" charset="0"/>
+              <a:ea typeface="Times New Roman" panose="02020603050405020304" pitchFamily="18" charset="0"/>
+              <a:cs typeface="Times New Roman" panose="02020603050405020304" pitchFamily="18" charset="0"/>
+            </a:endParaRPr>
+          </a:p>
+          <a:p>
+            <a:pPr marL="342900" lvl="0" indent="-342900">
+              <a:lnSpc>
+                <a:spcPct val="150000"/>
+              </a:lnSpc>
+              <a:spcAft>
+                <a:spcPts val="800"/>
+              </a:spcAft>
+              <a:buFont typeface="Symbol" panose="05050102010706020507" pitchFamily="18" charset="2"/>
+              <a:buChar char=""/>
+            </a:pPr>
+            <a:r>
+              <a:rPr lang="en-PH" sz="2000" dirty="0">
+                <a:latin typeface="Tahoma" panose="020B0604030504040204" pitchFamily="34" charset="0"/>
+                <a:ea typeface="Times New Roman" panose="02020603050405020304" pitchFamily="18" charset="0"/>
+                <a:cs typeface="Times New Roman" panose="02020603050405020304" pitchFamily="18" charset="0"/>
+              </a:rPr>
+              <a:t>Users want to use capable computers to accommodate their works or activities properly</a:t>
+            </a:r>
+            <a:br>
+              <a:rPr lang="en-PH" sz="2000" dirty="0">
+                <a:latin typeface="Tahoma" panose="020B0604030504040204" pitchFamily="34" charset="0"/>
+                <a:ea typeface="Times New Roman" panose="02020603050405020304" pitchFamily="18" charset="0"/>
+                <a:cs typeface="Times New Roman" panose="02020603050405020304" pitchFamily="18" charset="0"/>
+              </a:rPr>
+            </a:br>
+            <a:endParaRPr lang="en-PH" dirty="0">
+              <a:effectLst/>
+              <a:latin typeface="Calibri" panose="020F0502020204030204" pitchFamily="34" charset="0"/>
+              <a:ea typeface="Times New Roman" panose="02020603050405020304" pitchFamily="18" charset="0"/>
+              <a:cs typeface="Times New Roman" panose="02020603050405020304" pitchFamily="18" charset="0"/>
+            </a:endParaRPr>
+          </a:p>
+          <a:p>
+            <a:pPr marL="342900" lvl="0" indent="-342900">
+              <a:lnSpc>
+                <a:spcPct val="150000"/>
+              </a:lnSpc>
+              <a:spcAft>
+                <a:spcPts val="800"/>
+              </a:spcAft>
+              <a:buFont typeface="Symbol" panose="05050102010706020507" pitchFamily="18" charset="2"/>
+              <a:buChar char=""/>
+            </a:pPr>
+            <a:r>
+              <a:rPr lang="en-PH" sz="2000" dirty="0">
+                <a:latin typeface="Tahoma" panose="020B0604030504040204" pitchFamily="34" charset="0"/>
+                <a:ea typeface="Times New Roman" panose="02020603050405020304" pitchFamily="18" charset="0"/>
+                <a:cs typeface="Times New Roman" panose="02020603050405020304" pitchFamily="18" charset="0"/>
+              </a:rPr>
+              <a:t>Users do not want to waste time and want to have easy access to available computers</a:t>
+            </a:r>
+            <a:br>
+              <a:rPr lang="en-PH" sz="2000" dirty="0">
+                <a:latin typeface="Tahoma" panose="020B0604030504040204" pitchFamily="34" charset="0"/>
+                <a:ea typeface="Times New Roman" panose="02020603050405020304" pitchFamily="18" charset="0"/>
+                <a:cs typeface="Times New Roman" panose="02020603050405020304" pitchFamily="18" charset="0"/>
+              </a:rPr>
+            </a:br>
+            <a:endParaRPr lang="en-PH" dirty="0">
+              <a:effectLst/>
+              <a:latin typeface="Calibri" panose="020F0502020204030204" pitchFamily="34" charset="0"/>
+              <a:ea typeface="Times New Roman" panose="02020603050405020304" pitchFamily="18" charset="0"/>
+              <a:cs typeface="Times New Roman" panose="02020603050405020304" pitchFamily="18" charset="0"/>
+            </a:endParaRPr>
+          </a:p>
+          <a:p>
+            <a:pPr marL="342900" lvl="0" indent="-342900">
+              <a:lnSpc>
+                <a:spcPct val="150000"/>
+              </a:lnSpc>
+              <a:spcAft>
+                <a:spcPts val="800"/>
+              </a:spcAft>
+              <a:buFont typeface="Symbol" panose="05050102010706020507" pitchFamily="18" charset="2"/>
+              <a:buChar char=""/>
+            </a:pPr>
+            <a:r>
+              <a:rPr lang="en-US" sz="2000" dirty="0">
+                <a:latin typeface="Tahoma" panose="020B0604030504040204" pitchFamily="34" charset="0"/>
+                <a:ea typeface="Times New Roman" panose="02020603050405020304" pitchFamily="18" charset="0"/>
+                <a:cs typeface="Times New Roman" panose="02020603050405020304" pitchFamily="18" charset="0"/>
+              </a:rPr>
+              <a:t>Users want to know the opening hours of different Internet Cafes due to their different time schedules</a:t>
+            </a:r>
+            <a:endParaRPr lang="en-PH" dirty="0">
+              <a:effectLst/>
+              <a:latin typeface="Calibri" panose="020F0502020204030204" pitchFamily="34" charset="0"/>
+              <a:ea typeface="Times New Roman" panose="02020603050405020304" pitchFamily="18" charset="0"/>
+              <a:cs typeface="Times New Roman" panose="02020603050405020304" pitchFamily="18" charset="0"/>
+            </a:endParaRPr>
+          </a:p>
+        </p:txBody>
+      </p:sp>
     </p:spTree>
     <p:extLst>
       <p:ext uri="{BB962C8B-B14F-4D97-AF65-F5344CB8AC3E}">
-        <p14:creationId xmlns:p14="http://schemas.microsoft.com/office/powerpoint/2010/main" val="518183743"/>
+        <p14:creationId xmlns:p14="http://schemas.microsoft.com/office/powerpoint/2010/main" val="2618529223"/>
       </p:ext>
     </p:extLst>
   </p:cSld>
@@ -13987,10 +15834,10 @@
       </p:grpSpPr>
       <p:sp>
         <p:nvSpPr>
-          <p:cNvPr id="3" name="TextBox 2">
-            <a:extLst>
-              <a:ext uri="{FF2B5EF4-FFF2-40B4-BE49-F238E27FC236}">
-                <a16:creationId xmlns:a16="http://schemas.microsoft.com/office/drawing/2014/main" id="{841ED2A2-F5EC-4F86-880E-1BCDD23115CA}"/>
+          <p:cNvPr id="2" name="TextBox 1">
+            <a:extLst>
+              <a:ext uri="{FF2B5EF4-FFF2-40B4-BE49-F238E27FC236}">
+                <a16:creationId xmlns:a16="http://schemas.microsoft.com/office/drawing/2014/main" id="{6805BCAE-0CD9-4EB5-98C3-81A995CD53F0}"/>
               </a:ext>
             </a:extLst>
           </p:cNvPr>
@@ -13999,8 +15846,8 @@
         </p:nvSpPr>
         <p:spPr>
           <a:xfrm>
-            <a:off x="1959429" y="2046514"/>
-            <a:ext cx="10029371" cy="2215991"/>
+            <a:off x="333829" y="377371"/>
+            <a:ext cx="6066971" cy="923330"/>
           </a:xfrm>
           <a:prstGeom prst="rect">
             <a:avLst/>
@@ -14014,16 +15861,124 @@
           <a:lstStyle/>
           <a:p>
             <a:r>
-              <a:rPr lang="en-PH" sz="13800" dirty="0"/>
-              <a:t>PROTOTYPE</a:t>
-            </a:r>
-          </a:p>
-        </p:txBody>
-      </p:sp>
+              <a:rPr lang="en-PH" sz="5400" b="1" dirty="0"/>
+              <a:t>STORYBOARD</a:t>
+            </a:r>
+          </a:p>
+        </p:txBody>
+      </p:sp>
+      <p:pic>
+        <p:nvPicPr>
+          <p:cNvPr id="4" name="Picture 3" descr="A close up of text on a white background&#10;&#10;Description automatically generated">
+            <a:extLst>
+              <a:ext uri="{FF2B5EF4-FFF2-40B4-BE49-F238E27FC236}">
+                <a16:creationId xmlns:a16="http://schemas.microsoft.com/office/drawing/2014/main" id="{80B8D095-BA4A-44B4-B155-3BAB68357912}"/>
+              </a:ext>
+            </a:extLst>
+          </p:cNvPr>
+          <p:cNvPicPr>
+            <a:picLocks noChangeAspect="1"/>
+          </p:cNvPicPr>
+          <p:nvPr/>
+        </p:nvPicPr>
+        <p:blipFill>
+          <a:blip r:embed="rId2">
+            <a:extLst>
+              <a:ext uri="{28A0092B-C50C-407E-A947-70E740481C1C}">
+                <a14:useLocalDpi xmlns:a14="http://schemas.microsoft.com/office/drawing/2010/main" val="0"/>
+              </a:ext>
+            </a:extLst>
+          </a:blip>
+          <a:stretch>
+            <a:fillRect/>
+          </a:stretch>
+        </p:blipFill>
+        <p:spPr>
+          <a:xfrm>
+            <a:off x="1062942" y="1402301"/>
+            <a:ext cx="2402783" cy="5078328"/>
+          </a:xfrm>
+          <a:prstGeom prst="rect">
+            <a:avLst/>
+          </a:prstGeom>
+        </p:spPr>
+      </p:pic>
+      <p:pic>
+        <p:nvPicPr>
+          <p:cNvPr id="7" name="Picture 6" descr="A close up of text on a white background&#10;&#10;Description automatically generated">
+            <a:extLst>
+              <a:ext uri="{FF2B5EF4-FFF2-40B4-BE49-F238E27FC236}">
+                <a16:creationId xmlns:a16="http://schemas.microsoft.com/office/drawing/2014/main" id="{CBE8E101-F4DF-4E88-A8CD-A65FAB9622F7}"/>
+              </a:ext>
+            </a:extLst>
+          </p:cNvPr>
+          <p:cNvPicPr>
+            <a:picLocks noChangeAspect="1"/>
+          </p:cNvPicPr>
+          <p:nvPr/>
+        </p:nvPicPr>
+        <p:blipFill>
+          <a:blip r:embed="rId3">
+            <a:extLst>
+              <a:ext uri="{28A0092B-C50C-407E-A947-70E740481C1C}">
+                <a14:useLocalDpi xmlns:a14="http://schemas.microsoft.com/office/drawing/2010/main" val="0"/>
+              </a:ext>
+            </a:extLst>
+          </a:blip>
+          <a:stretch>
+            <a:fillRect/>
+          </a:stretch>
+        </p:blipFill>
+        <p:spPr>
+          <a:xfrm>
+            <a:off x="4999555" y="1402301"/>
+            <a:ext cx="2402783" cy="5078328"/>
+          </a:xfrm>
+          <a:prstGeom prst="rect">
+            <a:avLst/>
+          </a:prstGeom>
+        </p:spPr>
+      </p:pic>
+      <p:pic>
+        <p:nvPicPr>
+          <p:cNvPr id="9" name="Picture 8" descr="A close up of text on a white background&#10;&#10;Description automatically generated">
+            <a:extLst>
+              <a:ext uri="{FF2B5EF4-FFF2-40B4-BE49-F238E27FC236}">
+                <a16:creationId xmlns:a16="http://schemas.microsoft.com/office/drawing/2014/main" id="{E5E832F6-51DD-4CB2-9F3F-92E95113F4B7}"/>
+              </a:ext>
+            </a:extLst>
+          </p:cNvPr>
+          <p:cNvPicPr>
+            <a:picLocks noChangeAspect="1"/>
+          </p:cNvPicPr>
+          <p:nvPr/>
+        </p:nvPicPr>
+        <p:blipFill>
+          <a:blip r:embed="rId4">
+            <a:extLst>
+              <a:ext uri="{28A0092B-C50C-407E-A947-70E740481C1C}">
+                <a14:useLocalDpi xmlns:a14="http://schemas.microsoft.com/office/drawing/2010/main" val="0"/>
+              </a:ext>
+            </a:extLst>
+          </a:blip>
+          <a:stretch>
+            <a:fillRect/>
+          </a:stretch>
+        </p:blipFill>
+        <p:spPr>
+          <a:xfrm>
+            <a:off x="9037768" y="1402301"/>
+            <a:ext cx="2402783" cy="5078328"/>
+          </a:xfrm>
+          <a:prstGeom prst="rect">
+            <a:avLst/>
+          </a:prstGeom>
+        </p:spPr>
+      </p:pic>
     </p:spTree>
     <p:extLst>
       <p:ext uri="{BB962C8B-B14F-4D97-AF65-F5344CB8AC3E}">
-        <p14:creationId xmlns:p14="http://schemas.microsoft.com/office/powerpoint/2010/main" val="755244714"/>
+        <p14:creationId xmlns:p14="http://schemas.microsoft.com/office/powerpoint/2010/main" val="518183743"/>
       </p:ext>
     </p:extLst>
   </p:cSld>
@@ -14050,625 +16005,12 @@
           <a:chExt cx="0" cy="0"/>
         </a:xfrm>
       </p:grpSpPr>
-      <p:grpSp>
-        <p:nvGrpSpPr>
-          <p:cNvPr id="13" name="Group 12">
-            <a:extLst>
-              <a:ext uri="{FF2B5EF4-FFF2-40B4-BE49-F238E27FC236}">
-                <a16:creationId xmlns:a16="http://schemas.microsoft.com/office/drawing/2014/main" id="{FEFCE114-C2B0-4848-86BC-85AC8BA9CCEA}"/>
-              </a:ext>
-            </a:extLst>
-          </p:cNvPr>
-          <p:cNvGrpSpPr/>
-          <p:nvPr/>
-        </p:nvGrpSpPr>
-        <p:grpSpPr>
-          <a:xfrm>
-            <a:off x="8063946" y="268356"/>
-            <a:ext cx="3697357" cy="6321287"/>
-            <a:chOff x="318052" y="238539"/>
-            <a:chExt cx="3697357" cy="6321287"/>
-          </a:xfrm>
-        </p:grpSpPr>
-        <p:sp>
-          <p:nvSpPr>
-            <p:cNvPr id="12" name="Rectangle 11">
-              <a:extLst>
-                <a:ext uri="{FF2B5EF4-FFF2-40B4-BE49-F238E27FC236}">
-                  <a16:creationId xmlns:a16="http://schemas.microsoft.com/office/drawing/2014/main" id="{FB6E30D5-3059-4768-8D72-A2C4584983B4}"/>
-                </a:ext>
-              </a:extLst>
-            </p:cNvPr>
-            <p:cNvSpPr/>
-            <p:nvPr/>
-          </p:nvSpPr>
-          <p:spPr>
-            <a:xfrm>
-              <a:off x="1364974" y="4320042"/>
-              <a:ext cx="1577009" cy="523220"/>
-            </a:xfrm>
-            <a:prstGeom prst="rect">
-              <a:avLst/>
-            </a:prstGeom>
-            <a:noFill/>
-            <a:ln>
-              <a:solidFill>
-                <a:schemeClr val="tx1"/>
-              </a:solidFill>
-            </a:ln>
-          </p:spPr>
-          <p:style>
-            <a:lnRef idx="2">
-              <a:schemeClr val="accent1">
-                <a:shade val="50000"/>
-              </a:schemeClr>
-            </a:lnRef>
-            <a:fillRef idx="1">
-              <a:schemeClr val="accent1"/>
-            </a:fillRef>
-            <a:effectRef idx="0">
-              <a:schemeClr val="accent1"/>
-            </a:effectRef>
-            <a:fontRef idx="minor">
-              <a:schemeClr val="lt1"/>
-            </a:fontRef>
-          </p:style>
-          <p:txBody>
-            <a:bodyPr rtlCol="0" anchor="ctr"/>
-            <a:lstStyle/>
-            <a:p>
-              <a:pPr algn="ctr"/>
-              <a:endParaRPr lang="en-PH"/>
-            </a:p>
-          </p:txBody>
-        </p:sp>
-        <p:sp>
-          <p:nvSpPr>
-            <p:cNvPr id="5" name="Rectangle: Rounded Corners 4">
-              <a:extLst>
-                <a:ext uri="{FF2B5EF4-FFF2-40B4-BE49-F238E27FC236}">
-                  <a16:creationId xmlns:a16="http://schemas.microsoft.com/office/drawing/2014/main" id="{A0068AB8-F468-431F-A6B5-2F981DC0705D}"/>
-                </a:ext>
-              </a:extLst>
-            </p:cNvPr>
-            <p:cNvSpPr/>
-            <p:nvPr/>
-          </p:nvSpPr>
-          <p:spPr>
-            <a:xfrm>
-              <a:off x="318052" y="238539"/>
-              <a:ext cx="3697357" cy="6321287"/>
-            </a:xfrm>
-            <a:prstGeom prst="roundRect">
-              <a:avLst/>
-            </a:prstGeom>
-            <a:noFill/>
-            <a:ln>
-              <a:solidFill>
-                <a:schemeClr val="tx1"/>
-              </a:solidFill>
-            </a:ln>
-          </p:spPr>
-          <p:style>
-            <a:lnRef idx="2">
-              <a:schemeClr val="accent1">
-                <a:shade val="50000"/>
-              </a:schemeClr>
-            </a:lnRef>
-            <a:fillRef idx="1">
-              <a:schemeClr val="accent1"/>
-            </a:fillRef>
-            <a:effectRef idx="0">
-              <a:schemeClr val="accent1"/>
-            </a:effectRef>
-            <a:fontRef idx="minor">
-              <a:schemeClr val="lt1"/>
-            </a:fontRef>
-          </p:style>
-          <p:txBody>
-            <a:bodyPr rtlCol="0" anchor="ctr"/>
-            <a:lstStyle/>
-            <a:p>
-              <a:pPr algn="ctr"/>
-              <a:endParaRPr lang="en-PH"/>
-            </a:p>
-          </p:txBody>
-        </p:sp>
-        <p:sp>
-          <p:nvSpPr>
-            <p:cNvPr id="6" name="Rectangle: Rounded Corners 5">
-              <a:extLst>
-                <a:ext uri="{FF2B5EF4-FFF2-40B4-BE49-F238E27FC236}">
-                  <a16:creationId xmlns:a16="http://schemas.microsoft.com/office/drawing/2014/main" id="{5D35D462-3A75-4FB6-8E8A-FF6E9B6FC323}"/>
-                </a:ext>
-              </a:extLst>
-            </p:cNvPr>
-            <p:cNvSpPr/>
-            <p:nvPr/>
-          </p:nvSpPr>
-          <p:spPr>
-            <a:xfrm>
-              <a:off x="622852" y="927651"/>
-              <a:ext cx="3048000" cy="4943061"/>
-            </a:xfrm>
-            <a:prstGeom prst="roundRect">
-              <a:avLst/>
-            </a:prstGeom>
-            <a:solidFill>
-              <a:srgbClr val="FFC000"/>
-            </a:solidFill>
-            <a:ln>
-              <a:solidFill>
-                <a:schemeClr val="tx1"/>
-              </a:solidFill>
-            </a:ln>
-          </p:spPr>
-          <p:style>
-            <a:lnRef idx="2">
-              <a:schemeClr val="accent1">
-                <a:shade val="50000"/>
-              </a:schemeClr>
-            </a:lnRef>
-            <a:fillRef idx="1">
-              <a:schemeClr val="accent1"/>
-            </a:fillRef>
-            <a:effectRef idx="0">
-              <a:schemeClr val="accent1"/>
-            </a:effectRef>
-            <a:fontRef idx="minor">
-              <a:schemeClr val="lt1"/>
-            </a:fontRef>
-          </p:style>
-          <p:txBody>
-            <a:bodyPr rtlCol="0" anchor="ctr"/>
-            <a:lstStyle/>
-            <a:p>
-              <a:pPr algn="ctr"/>
-              <a:endParaRPr lang="en-PH"/>
-            </a:p>
-          </p:txBody>
-        </p:sp>
-      </p:grpSp>
-      <p:grpSp>
-        <p:nvGrpSpPr>
-          <p:cNvPr id="14" name="Group 13">
-            <a:extLst>
-              <a:ext uri="{FF2B5EF4-FFF2-40B4-BE49-F238E27FC236}">
-                <a16:creationId xmlns:a16="http://schemas.microsoft.com/office/drawing/2014/main" id="{2C60ABC9-F770-42CA-B114-04AFD08352DC}"/>
-              </a:ext>
-            </a:extLst>
-          </p:cNvPr>
-          <p:cNvGrpSpPr/>
-          <p:nvPr/>
-        </p:nvGrpSpPr>
-        <p:grpSpPr>
-          <a:xfrm>
-            <a:off x="318049" y="268356"/>
-            <a:ext cx="3697357" cy="6321287"/>
-            <a:chOff x="318052" y="238539"/>
-            <a:chExt cx="3697357" cy="6321287"/>
-          </a:xfrm>
-        </p:grpSpPr>
-        <p:sp>
-          <p:nvSpPr>
-            <p:cNvPr id="15" name="Rectangle 14">
-              <a:extLst>
-                <a:ext uri="{FF2B5EF4-FFF2-40B4-BE49-F238E27FC236}">
-                  <a16:creationId xmlns:a16="http://schemas.microsoft.com/office/drawing/2014/main" id="{DCCB478B-FFCE-49F2-9519-385895F93F22}"/>
-                </a:ext>
-              </a:extLst>
-            </p:cNvPr>
-            <p:cNvSpPr/>
-            <p:nvPr/>
-          </p:nvSpPr>
-          <p:spPr>
-            <a:xfrm>
-              <a:off x="1364974" y="4320042"/>
-              <a:ext cx="1577009" cy="523220"/>
-            </a:xfrm>
-            <a:prstGeom prst="rect">
-              <a:avLst/>
-            </a:prstGeom>
-            <a:noFill/>
-            <a:ln>
-              <a:solidFill>
-                <a:schemeClr val="tx1"/>
-              </a:solidFill>
-            </a:ln>
-          </p:spPr>
-          <p:style>
-            <a:lnRef idx="2">
-              <a:schemeClr val="accent1">
-                <a:shade val="50000"/>
-              </a:schemeClr>
-            </a:lnRef>
-            <a:fillRef idx="1">
-              <a:schemeClr val="accent1"/>
-            </a:fillRef>
-            <a:effectRef idx="0">
-              <a:schemeClr val="accent1"/>
-            </a:effectRef>
-            <a:fontRef idx="minor">
-              <a:schemeClr val="lt1"/>
-            </a:fontRef>
-          </p:style>
-          <p:txBody>
-            <a:bodyPr rtlCol="0" anchor="ctr"/>
-            <a:lstStyle/>
-            <a:p>
-              <a:pPr algn="ctr"/>
-              <a:endParaRPr lang="en-PH"/>
-            </a:p>
-          </p:txBody>
-        </p:sp>
-        <p:sp>
-          <p:nvSpPr>
-            <p:cNvPr id="16" name="Rectangle: Rounded Corners 15">
-              <a:extLst>
-                <a:ext uri="{FF2B5EF4-FFF2-40B4-BE49-F238E27FC236}">
-                  <a16:creationId xmlns:a16="http://schemas.microsoft.com/office/drawing/2014/main" id="{B0D6BFE9-7759-44A0-B8B1-AFDE0EAA6F94}"/>
-                </a:ext>
-              </a:extLst>
-            </p:cNvPr>
-            <p:cNvSpPr/>
-            <p:nvPr/>
-          </p:nvSpPr>
-          <p:spPr>
-            <a:xfrm>
-              <a:off x="318052" y="238539"/>
-              <a:ext cx="3697357" cy="6321287"/>
-            </a:xfrm>
-            <a:prstGeom prst="roundRect">
-              <a:avLst/>
-            </a:prstGeom>
-            <a:noFill/>
-            <a:ln>
-              <a:solidFill>
-                <a:schemeClr val="tx1"/>
-              </a:solidFill>
-            </a:ln>
-          </p:spPr>
-          <p:style>
-            <a:lnRef idx="2">
-              <a:schemeClr val="accent1">
-                <a:shade val="50000"/>
-              </a:schemeClr>
-            </a:lnRef>
-            <a:fillRef idx="1">
-              <a:schemeClr val="accent1"/>
-            </a:fillRef>
-            <a:effectRef idx="0">
-              <a:schemeClr val="accent1"/>
-            </a:effectRef>
-            <a:fontRef idx="minor">
-              <a:schemeClr val="lt1"/>
-            </a:fontRef>
-          </p:style>
-          <p:txBody>
-            <a:bodyPr rtlCol="0" anchor="ctr"/>
-            <a:lstStyle/>
-            <a:p>
-              <a:pPr algn="ctr"/>
-              <a:endParaRPr lang="en-PH"/>
-            </a:p>
-          </p:txBody>
-        </p:sp>
-        <p:sp>
-          <p:nvSpPr>
-            <p:cNvPr id="17" name="Rectangle: Rounded Corners 16">
-              <a:extLst>
-                <a:ext uri="{FF2B5EF4-FFF2-40B4-BE49-F238E27FC236}">
-                  <a16:creationId xmlns:a16="http://schemas.microsoft.com/office/drawing/2014/main" id="{73BFF76E-2242-45AB-9CBB-67CA5C18A08F}"/>
-                </a:ext>
-              </a:extLst>
-            </p:cNvPr>
-            <p:cNvSpPr/>
-            <p:nvPr/>
-          </p:nvSpPr>
-          <p:spPr>
-            <a:xfrm>
-              <a:off x="622852" y="927651"/>
-              <a:ext cx="3048000" cy="4943061"/>
-            </a:xfrm>
-            <a:prstGeom prst="roundRect">
-              <a:avLst/>
-            </a:prstGeom>
-            <a:solidFill>
-              <a:srgbClr val="FFC000"/>
-            </a:solidFill>
-            <a:ln>
-              <a:solidFill>
-                <a:schemeClr val="tx1"/>
-              </a:solidFill>
-            </a:ln>
-          </p:spPr>
-          <p:style>
-            <a:lnRef idx="2">
-              <a:schemeClr val="accent1">
-                <a:shade val="50000"/>
-              </a:schemeClr>
-            </a:lnRef>
-            <a:fillRef idx="1">
-              <a:schemeClr val="accent1"/>
-            </a:fillRef>
-            <a:effectRef idx="0">
-              <a:schemeClr val="accent1"/>
-            </a:effectRef>
-            <a:fontRef idx="minor">
-              <a:schemeClr val="lt1"/>
-            </a:fontRef>
-          </p:style>
-          <p:txBody>
-            <a:bodyPr rtlCol="0" anchor="ctr"/>
-            <a:lstStyle/>
-            <a:p>
-              <a:pPr algn="ctr"/>
-              <a:endParaRPr lang="en-PH" dirty="0"/>
-            </a:p>
-          </p:txBody>
-        </p:sp>
-        <p:sp>
-          <p:nvSpPr>
-            <p:cNvPr id="18" name="TextBox 17">
-              <a:extLst>
-                <a:ext uri="{FF2B5EF4-FFF2-40B4-BE49-F238E27FC236}">
-                  <a16:creationId xmlns:a16="http://schemas.microsoft.com/office/drawing/2014/main" id="{689FCB6D-27FC-41CA-8BB5-CA7C220704E0}"/>
-                </a:ext>
-              </a:extLst>
-            </p:cNvPr>
-            <p:cNvSpPr txBox="1"/>
-            <p:nvPr/>
-          </p:nvSpPr>
-          <p:spPr>
-            <a:xfrm>
-              <a:off x="1119808" y="1630018"/>
-              <a:ext cx="2054087" cy="646331"/>
-            </a:xfrm>
-            <a:prstGeom prst="rect">
-              <a:avLst/>
-            </a:prstGeom>
-            <a:noFill/>
-          </p:spPr>
-          <p:txBody>
-            <a:bodyPr wrap="square" rtlCol="0">
-              <a:spAutoFit/>
-            </a:bodyPr>
-            <a:lstStyle/>
-            <a:p>
-              <a:pPr algn="ctr"/>
-              <a:r>
-                <a:rPr lang="en-PH" sz="3600" b="1" dirty="0">
-                  <a:latin typeface="Gill Sans MT" panose="020B0502020104020203" pitchFamily="34" charset="0"/>
-                </a:rPr>
-                <a:t>HANAP </a:t>
-              </a:r>
-            </a:p>
-          </p:txBody>
-        </p:sp>
-        <p:sp>
-          <p:nvSpPr>
-            <p:cNvPr id="19" name="TextBox 18">
-              <a:extLst>
-                <a:ext uri="{FF2B5EF4-FFF2-40B4-BE49-F238E27FC236}">
-                  <a16:creationId xmlns:a16="http://schemas.microsoft.com/office/drawing/2014/main" id="{696D6BCE-F8F0-461B-81D9-50AABAE1BE8D}"/>
-                </a:ext>
-              </a:extLst>
-            </p:cNvPr>
-            <p:cNvSpPr txBox="1"/>
-            <p:nvPr/>
-          </p:nvSpPr>
-          <p:spPr>
-            <a:xfrm>
-              <a:off x="1139686" y="2166731"/>
-              <a:ext cx="2054087" cy="646331"/>
-            </a:xfrm>
-            <a:prstGeom prst="rect">
-              <a:avLst/>
-            </a:prstGeom>
-            <a:noFill/>
-          </p:spPr>
-          <p:txBody>
-            <a:bodyPr wrap="square" rtlCol="0">
-              <a:spAutoFit/>
-            </a:bodyPr>
-            <a:lstStyle/>
-            <a:p>
-              <a:pPr algn="ctr"/>
-              <a:r>
-                <a:rPr lang="en-PH" sz="3600" b="1" dirty="0">
-                  <a:latin typeface="Gill Sans MT" panose="020B0502020104020203" pitchFamily="34" charset="0"/>
-                </a:rPr>
-                <a:t>PC </a:t>
-              </a:r>
-            </a:p>
-          </p:txBody>
-        </p:sp>
-      </p:grpSp>
-      <p:grpSp>
-        <p:nvGrpSpPr>
-          <p:cNvPr id="28" name="Group 27">
-            <a:extLst>
-              <a:ext uri="{FF2B5EF4-FFF2-40B4-BE49-F238E27FC236}">
-                <a16:creationId xmlns:a16="http://schemas.microsoft.com/office/drawing/2014/main" id="{A6415594-4A73-4D16-8A76-1C2B8B18DCB7}"/>
-              </a:ext>
-            </a:extLst>
-          </p:cNvPr>
-          <p:cNvGrpSpPr/>
-          <p:nvPr/>
-        </p:nvGrpSpPr>
-        <p:grpSpPr>
-          <a:xfrm>
-            <a:off x="4214189" y="268356"/>
-            <a:ext cx="3697357" cy="6321287"/>
-            <a:chOff x="318052" y="238539"/>
-            <a:chExt cx="3697357" cy="6321287"/>
-          </a:xfrm>
-        </p:grpSpPr>
-        <p:sp>
-          <p:nvSpPr>
-            <p:cNvPr id="29" name="Rectangle 28">
-              <a:extLst>
-                <a:ext uri="{FF2B5EF4-FFF2-40B4-BE49-F238E27FC236}">
-                  <a16:creationId xmlns:a16="http://schemas.microsoft.com/office/drawing/2014/main" id="{7B476E0B-2A02-4EF8-940A-80CD2B1CAF99}"/>
-                </a:ext>
-              </a:extLst>
-            </p:cNvPr>
-            <p:cNvSpPr/>
-            <p:nvPr/>
-          </p:nvSpPr>
-          <p:spPr>
-            <a:xfrm>
-              <a:off x="1364974" y="4320042"/>
-              <a:ext cx="1577009" cy="523220"/>
-            </a:xfrm>
-            <a:prstGeom prst="rect">
-              <a:avLst/>
-            </a:prstGeom>
-            <a:noFill/>
-            <a:ln>
-              <a:solidFill>
-                <a:schemeClr val="tx1"/>
-              </a:solidFill>
-            </a:ln>
-          </p:spPr>
-          <p:style>
-            <a:lnRef idx="2">
-              <a:schemeClr val="accent1">
-                <a:shade val="50000"/>
-              </a:schemeClr>
-            </a:lnRef>
-            <a:fillRef idx="1">
-              <a:schemeClr val="accent1"/>
-            </a:fillRef>
-            <a:effectRef idx="0">
-              <a:schemeClr val="accent1"/>
-            </a:effectRef>
-            <a:fontRef idx="minor">
-              <a:schemeClr val="lt1"/>
-            </a:fontRef>
-          </p:style>
-          <p:txBody>
-            <a:bodyPr rtlCol="0" anchor="ctr"/>
-            <a:lstStyle/>
-            <a:p>
-              <a:pPr algn="ctr"/>
-              <a:endParaRPr lang="en-PH"/>
-            </a:p>
-          </p:txBody>
-        </p:sp>
-        <p:sp>
-          <p:nvSpPr>
-            <p:cNvPr id="30" name="Rectangle: Rounded Corners 29">
-              <a:extLst>
-                <a:ext uri="{FF2B5EF4-FFF2-40B4-BE49-F238E27FC236}">
-                  <a16:creationId xmlns:a16="http://schemas.microsoft.com/office/drawing/2014/main" id="{473803C9-B3E4-4F64-BBB8-8659B9574A68}"/>
-                </a:ext>
-              </a:extLst>
-            </p:cNvPr>
-            <p:cNvSpPr/>
-            <p:nvPr/>
-          </p:nvSpPr>
-          <p:spPr>
-            <a:xfrm>
-              <a:off x="318052" y="238539"/>
-              <a:ext cx="3697357" cy="6321287"/>
-            </a:xfrm>
-            <a:prstGeom prst="roundRect">
-              <a:avLst/>
-            </a:prstGeom>
-            <a:noFill/>
-            <a:ln>
-              <a:solidFill>
-                <a:schemeClr val="tx1"/>
-              </a:solidFill>
-            </a:ln>
-          </p:spPr>
-          <p:style>
-            <a:lnRef idx="2">
-              <a:schemeClr val="accent1">
-                <a:shade val="50000"/>
-              </a:schemeClr>
-            </a:lnRef>
-            <a:fillRef idx="1">
-              <a:schemeClr val="accent1"/>
-            </a:fillRef>
-            <a:effectRef idx="0">
-              <a:schemeClr val="accent1"/>
-            </a:effectRef>
-            <a:fontRef idx="minor">
-              <a:schemeClr val="lt1"/>
-            </a:fontRef>
-          </p:style>
-          <p:txBody>
-            <a:bodyPr rtlCol="0" anchor="ctr"/>
-            <a:lstStyle/>
-            <a:p>
-              <a:pPr algn="ctr"/>
-              <a:endParaRPr lang="en-PH"/>
-            </a:p>
-          </p:txBody>
-        </p:sp>
-        <p:sp>
-          <p:nvSpPr>
-            <p:cNvPr id="31" name="Rectangle: Rounded Corners 30">
-              <a:extLst>
-                <a:ext uri="{FF2B5EF4-FFF2-40B4-BE49-F238E27FC236}">
-                  <a16:creationId xmlns:a16="http://schemas.microsoft.com/office/drawing/2014/main" id="{53BD5A12-9239-45F2-B201-60E1EAC0B4D9}"/>
-                </a:ext>
-              </a:extLst>
-            </p:cNvPr>
-            <p:cNvSpPr/>
-            <p:nvPr/>
-          </p:nvSpPr>
-          <p:spPr>
-            <a:xfrm>
-              <a:off x="622852" y="927651"/>
-              <a:ext cx="3048000" cy="4943061"/>
-            </a:xfrm>
-            <a:prstGeom prst="roundRect">
-              <a:avLst/>
-            </a:prstGeom>
-            <a:solidFill>
-              <a:srgbClr val="FFC000"/>
-            </a:solidFill>
-            <a:ln>
-              <a:solidFill>
-                <a:schemeClr val="tx1"/>
-              </a:solidFill>
-            </a:ln>
-          </p:spPr>
-          <p:style>
-            <a:lnRef idx="2">
-              <a:schemeClr val="accent1">
-                <a:shade val="50000"/>
-              </a:schemeClr>
-            </a:lnRef>
-            <a:fillRef idx="1">
-              <a:schemeClr val="accent1"/>
-            </a:fillRef>
-            <a:effectRef idx="0">
-              <a:schemeClr val="accent1"/>
-            </a:effectRef>
-            <a:fontRef idx="minor">
-              <a:schemeClr val="lt1"/>
-            </a:fontRef>
-          </p:style>
-          <p:txBody>
-            <a:bodyPr rtlCol="0" anchor="ctr"/>
-            <a:lstStyle/>
-            <a:p>
-              <a:pPr algn="ctr"/>
-              <a:endParaRPr lang="en-PH" dirty="0"/>
-            </a:p>
-          </p:txBody>
-        </p:sp>
-      </p:grpSp>
-      <p:sp>
-        <p:nvSpPr>
-          <p:cNvPr id="35" name="TextBox 34">
-            <a:extLst>
-              <a:ext uri="{FF2B5EF4-FFF2-40B4-BE49-F238E27FC236}">
-                <a16:creationId xmlns:a16="http://schemas.microsoft.com/office/drawing/2014/main" id="{7D5E5381-1F35-401C-9D71-13EA1DD114D2}"/>
+      <p:sp>
+        <p:nvSpPr>
+          <p:cNvPr id="3" name="TextBox 2">
+            <a:extLst>
+              <a:ext uri="{FF2B5EF4-FFF2-40B4-BE49-F238E27FC236}">
+                <a16:creationId xmlns:a16="http://schemas.microsoft.com/office/drawing/2014/main" id="{841ED2A2-F5EC-4F86-880E-1BCDD23115CA}"/>
               </a:ext>
             </a:extLst>
           </p:cNvPr>
@@ -14677,8 +16019,8 @@
         </p:nvSpPr>
         <p:spPr>
           <a:xfrm>
-            <a:off x="980655" y="3166044"/>
-            <a:ext cx="2332386" cy="646331"/>
+            <a:off x="1959429" y="2046514"/>
+            <a:ext cx="10029371" cy="2215991"/>
           </a:xfrm>
           <a:prstGeom prst="rect">
             <a:avLst/>
@@ -14691,809 +16033,9 @@
           </a:bodyPr>
           <a:lstStyle/>
           <a:p>
-            <a:pPr algn="ctr"/>
-            <a:r>
-              <a:rPr lang="en-PH" dirty="0"/>
-              <a:t>“Find cheapest pc rental near you.”</a:t>
-            </a:r>
-          </a:p>
-        </p:txBody>
-      </p:sp>
-      <p:sp>
-        <p:nvSpPr>
-          <p:cNvPr id="36" name="Rectangle 35">
-            <a:extLst>
-              <a:ext uri="{FF2B5EF4-FFF2-40B4-BE49-F238E27FC236}">
-                <a16:creationId xmlns:a16="http://schemas.microsoft.com/office/drawing/2014/main" id="{4E44DC3A-FF1F-4C0F-B477-98C09B503FEA}"/>
-              </a:ext>
-            </a:extLst>
-          </p:cNvPr>
-          <p:cNvSpPr/>
-          <p:nvPr/>
-        </p:nvSpPr>
-        <p:spPr>
-          <a:xfrm>
-            <a:off x="5411622" y="1186667"/>
-            <a:ext cx="1381541" cy="493644"/>
-          </a:xfrm>
-          <a:prstGeom prst="rect">
-            <a:avLst/>
-          </a:prstGeom>
-          <a:solidFill>
-            <a:schemeClr val="bg1"/>
-          </a:solidFill>
-        </p:spPr>
-        <p:style>
-          <a:lnRef idx="2">
-            <a:schemeClr val="accent1">
-              <a:shade val="50000"/>
-            </a:schemeClr>
-          </a:lnRef>
-          <a:fillRef idx="1">
-            <a:schemeClr val="accent1"/>
-          </a:fillRef>
-          <a:effectRef idx="0">
-            <a:schemeClr val="accent1"/>
-          </a:effectRef>
-          <a:fontRef idx="minor">
-            <a:schemeClr val="lt1"/>
-          </a:fontRef>
-        </p:style>
-        <p:txBody>
-          <a:bodyPr rtlCol="0" anchor="ctr"/>
-          <a:lstStyle/>
-          <a:p>
-            <a:pPr algn="ctr"/>
-            <a:r>
-              <a:rPr lang="en-PH" dirty="0">
-                <a:solidFill>
-                  <a:schemeClr val="tx1"/>
-                </a:solidFill>
-              </a:rPr>
-              <a:t>Nearest</a:t>
-            </a:r>
-          </a:p>
-        </p:txBody>
-      </p:sp>
-      <p:sp>
-        <p:nvSpPr>
-          <p:cNvPr id="41" name="Rectangle 40">
-            <a:extLst>
-              <a:ext uri="{FF2B5EF4-FFF2-40B4-BE49-F238E27FC236}">
-                <a16:creationId xmlns:a16="http://schemas.microsoft.com/office/drawing/2014/main" id="{D8D88DFF-8C65-4B5E-8820-E8CFDE3D2A05}"/>
-              </a:ext>
-            </a:extLst>
-          </p:cNvPr>
-          <p:cNvSpPr/>
-          <p:nvPr/>
-        </p:nvSpPr>
-        <p:spPr>
-          <a:xfrm>
-            <a:off x="1364970" y="4463922"/>
-            <a:ext cx="1381540" cy="493644"/>
-          </a:xfrm>
-          <a:prstGeom prst="rect">
-            <a:avLst/>
-          </a:prstGeom>
-          <a:solidFill>
-            <a:schemeClr val="bg1"/>
-          </a:solidFill>
-          <a:ln>
-            <a:solidFill>
-              <a:schemeClr val="tx1"/>
-            </a:solidFill>
-          </a:ln>
-        </p:spPr>
-        <p:style>
-          <a:lnRef idx="2">
-            <a:schemeClr val="accent1">
-              <a:shade val="50000"/>
-            </a:schemeClr>
-          </a:lnRef>
-          <a:fillRef idx="1">
-            <a:schemeClr val="accent1"/>
-          </a:fillRef>
-          <a:effectRef idx="0">
-            <a:schemeClr val="accent1"/>
-          </a:effectRef>
-          <a:fontRef idx="minor">
-            <a:schemeClr val="lt1"/>
-          </a:fontRef>
-        </p:style>
-        <p:txBody>
-          <a:bodyPr rtlCol="0" anchor="ctr"/>
-          <a:lstStyle/>
-          <a:p>
-            <a:pPr algn="ctr"/>
-            <a:r>
-              <a:rPr lang="en-PH" dirty="0">
-                <a:solidFill>
-                  <a:schemeClr val="tx1"/>
-                </a:solidFill>
-              </a:rPr>
-              <a:t>Cheapest</a:t>
-            </a:r>
-          </a:p>
-        </p:txBody>
-      </p:sp>
-      <p:sp>
-        <p:nvSpPr>
-          <p:cNvPr id="47" name="Rectangle 46">
-            <a:extLst>
-              <a:ext uri="{FF2B5EF4-FFF2-40B4-BE49-F238E27FC236}">
-                <a16:creationId xmlns:a16="http://schemas.microsoft.com/office/drawing/2014/main" id="{5BCF8B10-0EED-47C3-BA34-9C31CF114545}"/>
-              </a:ext>
-            </a:extLst>
-          </p:cNvPr>
-          <p:cNvSpPr/>
-          <p:nvPr/>
-        </p:nvSpPr>
-        <p:spPr>
-          <a:xfrm>
-            <a:off x="4833026" y="2081632"/>
-            <a:ext cx="2459682" cy="493644"/>
-          </a:xfrm>
-          <a:prstGeom prst="rect">
-            <a:avLst/>
-          </a:prstGeom>
-          <a:solidFill>
-            <a:schemeClr val="tx1"/>
-          </a:solidFill>
-          <a:ln>
-            <a:solidFill>
-              <a:schemeClr val="tx1"/>
-            </a:solidFill>
-          </a:ln>
-        </p:spPr>
-        <p:style>
-          <a:lnRef idx="2">
-            <a:schemeClr val="accent1">
-              <a:shade val="50000"/>
-            </a:schemeClr>
-          </a:lnRef>
-          <a:fillRef idx="1">
-            <a:schemeClr val="accent1"/>
-          </a:fillRef>
-          <a:effectRef idx="0">
-            <a:schemeClr val="accent1"/>
-          </a:effectRef>
-          <a:fontRef idx="minor">
-            <a:schemeClr val="lt1"/>
-          </a:fontRef>
-        </p:style>
-        <p:txBody>
-          <a:bodyPr rtlCol="0" anchor="ctr"/>
-          <a:lstStyle/>
-          <a:p>
-            <a:pPr algn="ctr"/>
-            <a:r>
-              <a:rPr lang="en-PH" dirty="0">
-                <a:solidFill>
-                  <a:schemeClr val="bg1"/>
-                </a:solidFill>
-              </a:rPr>
-              <a:t>  JUSTRENZ 200 Meters</a:t>
-            </a:r>
-          </a:p>
-        </p:txBody>
-      </p:sp>
-      <p:sp>
-        <p:nvSpPr>
-          <p:cNvPr id="51" name="TextBox 50">
-            <a:extLst>
-              <a:ext uri="{FF2B5EF4-FFF2-40B4-BE49-F238E27FC236}">
-                <a16:creationId xmlns:a16="http://schemas.microsoft.com/office/drawing/2014/main" id="{3914EA70-B6A7-4773-A846-FF23815AA96D}"/>
-              </a:ext>
-            </a:extLst>
-          </p:cNvPr>
-          <p:cNvSpPr txBox="1"/>
-          <p:nvPr/>
-        </p:nvSpPr>
-        <p:spPr>
-          <a:xfrm>
-            <a:off x="5105164" y="2658213"/>
-            <a:ext cx="1994456" cy="369332"/>
-          </a:xfrm>
-          <a:prstGeom prst="rect">
-            <a:avLst/>
-          </a:prstGeom>
-          <a:noFill/>
-          <a:ln>
-            <a:solidFill>
-              <a:schemeClr val="tx1"/>
-            </a:solidFill>
-          </a:ln>
-        </p:spPr>
-        <p:txBody>
-          <a:bodyPr wrap="square" rtlCol="0">
-            <a:spAutoFit/>
-          </a:bodyPr>
-          <a:lstStyle/>
-          <a:p>
-            <a:pPr algn="ctr"/>
-            <a:r>
-              <a:rPr lang="en-PH" b="1" dirty="0">
-                <a:latin typeface="Gill Sans MT" panose="020B0502020104020203" pitchFamily="34" charset="0"/>
-              </a:rPr>
-              <a:t>SHOW IN MAP </a:t>
-            </a:r>
-          </a:p>
-        </p:txBody>
-      </p:sp>
-      <p:sp>
-        <p:nvSpPr>
-          <p:cNvPr id="57" name="Arrow: Left 56">
-            <a:extLst>
-              <a:ext uri="{FF2B5EF4-FFF2-40B4-BE49-F238E27FC236}">
-                <a16:creationId xmlns:a16="http://schemas.microsoft.com/office/drawing/2014/main" id="{B0AC02CD-C2FA-4689-94D7-139D1EBD9CAD}"/>
-              </a:ext>
-            </a:extLst>
-          </p:cNvPr>
-          <p:cNvSpPr/>
-          <p:nvPr/>
-        </p:nvSpPr>
-        <p:spPr>
-          <a:xfrm>
-            <a:off x="4639938" y="1190309"/>
-            <a:ext cx="430671" cy="332350"/>
-          </a:xfrm>
-          <a:prstGeom prst="leftArrow">
-            <a:avLst/>
-          </a:prstGeom>
-          <a:solidFill>
-            <a:schemeClr val="bg1"/>
-          </a:solidFill>
-          <a:ln>
-            <a:solidFill>
-              <a:schemeClr val="tx1"/>
-            </a:solidFill>
-          </a:ln>
-        </p:spPr>
-        <p:style>
-          <a:lnRef idx="2">
-            <a:schemeClr val="accent1">
-              <a:shade val="50000"/>
-            </a:schemeClr>
-          </a:lnRef>
-          <a:fillRef idx="1">
-            <a:schemeClr val="accent1"/>
-          </a:fillRef>
-          <a:effectRef idx="0">
-            <a:schemeClr val="accent1"/>
-          </a:effectRef>
-          <a:fontRef idx="minor">
-            <a:schemeClr val="lt1"/>
-          </a:fontRef>
-        </p:style>
-        <p:txBody>
-          <a:bodyPr rtlCol="0" anchor="ctr"/>
-          <a:lstStyle/>
-          <a:p>
-            <a:pPr algn="ctr"/>
-            <a:endParaRPr lang="en-PH"/>
-          </a:p>
-        </p:txBody>
-      </p:sp>
-      <p:sp>
-        <p:nvSpPr>
-          <p:cNvPr id="62" name="Arrow: Left 61">
-            <a:extLst>
-              <a:ext uri="{FF2B5EF4-FFF2-40B4-BE49-F238E27FC236}">
-                <a16:creationId xmlns:a16="http://schemas.microsoft.com/office/drawing/2014/main" id="{0D4BF453-2CF9-4741-AFEF-0D091A6ADEDE}"/>
-              </a:ext>
-            </a:extLst>
-          </p:cNvPr>
-          <p:cNvSpPr/>
-          <p:nvPr/>
-        </p:nvSpPr>
-        <p:spPr>
-          <a:xfrm>
-            <a:off x="8432786" y="1190309"/>
-            <a:ext cx="430671" cy="332350"/>
-          </a:xfrm>
-          <a:prstGeom prst="leftArrow">
-            <a:avLst/>
-          </a:prstGeom>
-          <a:solidFill>
-            <a:schemeClr val="bg1"/>
-          </a:solidFill>
-          <a:ln>
-            <a:solidFill>
-              <a:schemeClr val="tx1"/>
-            </a:solidFill>
-          </a:ln>
-        </p:spPr>
-        <p:style>
-          <a:lnRef idx="2">
-            <a:schemeClr val="accent1">
-              <a:shade val="50000"/>
-            </a:schemeClr>
-          </a:lnRef>
-          <a:fillRef idx="1">
-            <a:schemeClr val="accent1"/>
-          </a:fillRef>
-          <a:effectRef idx="0">
-            <a:schemeClr val="accent1"/>
-          </a:effectRef>
-          <a:fontRef idx="minor">
-            <a:schemeClr val="lt1"/>
-          </a:fontRef>
-        </p:style>
-        <p:txBody>
-          <a:bodyPr rtlCol="0" anchor="ctr"/>
-          <a:lstStyle/>
-          <a:p>
-            <a:pPr algn="ctr"/>
-            <a:endParaRPr lang="en-PH"/>
-          </a:p>
-        </p:txBody>
-      </p:sp>
-      <p:sp>
-        <p:nvSpPr>
-          <p:cNvPr id="63" name="Rectangle 62">
-            <a:extLst>
-              <a:ext uri="{FF2B5EF4-FFF2-40B4-BE49-F238E27FC236}">
-                <a16:creationId xmlns:a16="http://schemas.microsoft.com/office/drawing/2014/main" id="{C2B999E3-4C7E-4178-86C0-BA07492F5FC5}"/>
-              </a:ext>
-            </a:extLst>
-          </p:cNvPr>
-          <p:cNvSpPr/>
-          <p:nvPr/>
-        </p:nvSpPr>
-        <p:spPr>
-          <a:xfrm>
-            <a:off x="1364970" y="3906704"/>
-            <a:ext cx="1381541" cy="493644"/>
-          </a:xfrm>
-          <a:prstGeom prst="rect">
-            <a:avLst/>
-          </a:prstGeom>
-          <a:solidFill>
-            <a:schemeClr val="bg1"/>
-          </a:solidFill>
-        </p:spPr>
-        <p:style>
-          <a:lnRef idx="2">
-            <a:schemeClr val="accent1">
-              <a:shade val="50000"/>
-            </a:schemeClr>
-          </a:lnRef>
-          <a:fillRef idx="1">
-            <a:schemeClr val="accent1"/>
-          </a:fillRef>
-          <a:effectRef idx="0">
-            <a:schemeClr val="accent1"/>
-          </a:effectRef>
-          <a:fontRef idx="minor">
-            <a:schemeClr val="lt1"/>
-          </a:fontRef>
-        </p:style>
-        <p:txBody>
-          <a:bodyPr rtlCol="0" anchor="ctr"/>
-          <a:lstStyle/>
-          <a:p>
-            <a:pPr algn="ctr"/>
-            <a:r>
-              <a:rPr lang="en-PH" dirty="0">
-                <a:solidFill>
-                  <a:schemeClr val="tx1"/>
-                </a:solidFill>
-              </a:rPr>
-              <a:t>Nearest</a:t>
-            </a:r>
-          </a:p>
-        </p:txBody>
-      </p:sp>
-      <p:sp>
-        <p:nvSpPr>
-          <p:cNvPr id="64" name="Rectangle 63">
-            <a:extLst>
-              <a:ext uri="{FF2B5EF4-FFF2-40B4-BE49-F238E27FC236}">
-                <a16:creationId xmlns:a16="http://schemas.microsoft.com/office/drawing/2014/main" id="{11CDB74E-4612-484B-BED7-7DDC5EE71A27}"/>
-              </a:ext>
-            </a:extLst>
-          </p:cNvPr>
-          <p:cNvSpPr/>
-          <p:nvPr/>
-        </p:nvSpPr>
-        <p:spPr>
-          <a:xfrm>
-            <a:off x="4851115" y="3097897"/>
-            <a:ext cx="2459682" cy="493644"/>
-          </a:xfrm>
-          <a:prstGeom prst="rect">
-            <a:avLst/>
-          </a:prstGeom>
-          <a:solidFill>
-            <a:schemeClr val="tx1"/>
-          </a:solidFill>
-          <a:ln>
-            <a:solidFill>
-              <a:schemeClr val="tx1"/>
-            </a:solidFill>
-          </a:ln>
-        </p:spPr>
-        <p:style>
-          <a:lnRef idx="2">
-            <a:schemeClr val="accent1">
-              <a:shade val="50000"/>
-            </a:schemeClr>
-          </a:lnRef>
-          <a:fillRef idx="1">
-            <a:schemeClr val="accent1"/>
-          </a:fillRef>
-          <a:effectRef idx="0">
-            <a:schemeClr val="accent1"/>
-          </a:effectRef>
-          <a:fontRef idx="minor">
-            <a:schemeClr val="lt1"/>
-          </a:fontRef>
-        </p:style>
-        <p:txBody>
-          <a:bodyPr rtlCol="0" anchor="ctr"/>
-          <a:lstStyle/>
-          <a:p>
-            <a:pPr algn="ctr"/>
-            <a:r>
-              <a:rPr lang="en-PH" dirty="0">
-                <a:solidFill>
-                  <a:schemeClr val="bg1"/>
-                </a:solidFill>
-              </a:rPr>
-              <a:t>  ROG 500 Meters</a:t>
-            </a:r>
-          </a:p>
-        </p:txBody>
-      </p:sp>
-      <p:sp>
-        <p:nvSpPr>
-          <p:cNvPr id="65" name="TextBox 64">
-            <a:extLst>
-              <a:ext uri="{FF2B5EF4-FFF2-40B4-BE49-F238E27FC236}">
-                <a16:creationId xmlns:a16="http://schemas.microsoft.com/office/drawing/2014/main" id="{825A416B-3A5F-45FC-B700-3B6293EAE689}"/>
-              </a:ext>
-            </a:extLst>
-          </p:cNvPr>
-          <p:cNvSpPr txBox="1"/>
-          <p:nvPr/>
-        </p:nvSpPr>
-        <p:spPr>
-          <a:xfrm>
-            <a:off x="5123253" y="3674478"/>
-            <a:ext cx="1994456" cy="369332"/>
-          </a:xfrm>
-          <a:prstGeom prst="rect">
-            <a:avLst/>
-          </a:prstGeom>
-          <a:noFill/>
-          <a:ln>
-            <a:solidFill>
-              <a:schemeClr val="tx1"/>
-            </a:solidFill>
-          </a:ln>
-        </p:spPr>
-        <p:txBody>
-          <a:bodyPr wrap="square" rtlCol="0">
-            <a:spAutoFit/>
-          </a:bodyPr>
-          <a:lstStyle/>
-          <a:p>
-            <a:pPr algn="ctr"/>
-            <a:r>
-              <a:rPr lang="en-PH" b="1" dirty="0">
-                <a:latin typeface="Gill Sans MT" panose="020B0502020104020203" pitchFamily="34" charset="0"/>
-              </a:rPr>
-              <a:t>SHOW IN MAP </a:t>
-            </a:r>
-          </a:p>
-        </p:txBody>
-      </p:sp>
-      <p:sp>
-        <p:nvSpPr>
-          <p:cNvPr id="66" name="Rectangle 65">
-            <a:extLst>
-              <a:ext uri="{FF2B5EF4-FFF2-40B4-BE49-F238E27FC236}">
-                <a16:creationId xmlns:a16="http://schemas.microsoft.com/office/drawing/2014/main" id="{4A41B964-41B5-4138-8C8C-56E0A006CF42}"/>
-              </a:ext>
-            </a:extLst>
-          </p:cNvPr>
-          <p:cNvSpPr/>
-          <p:nvPr/>
-        </p:nvSpPr>
-        <p:spPr>
-          <a:xfrm>
-            <a:off x="4848431" y="4153526"/>
-            <a:ext cx="2459682" cy="493644"/>
-          </a:xfrm>
-          <a:prstGeom prst="rect">
-            <a:avLst/>
-          </a:prstGeom>
-          <a:solidFill>
-            <a:schemeClr val="tx1"/>
-          </a:solidFill>
-          <a:ln>
-            <a:solidFill>
-              <a:schemeClr val="tx1"/>
-            </a:solidFill>
-          </a:ln>
-        </p:spPr>
-        <p:style>
-          <a:lnRef idx="2">
-            <a:schemeClr val="accent1">
-              <a:shade val="50000"/>
-            </a:schemeClr>
-          </a:lnRef>
-          <a:fillRef idx="1">
-            <a:schemeClr val="accent1"/>
-          </a:fillRef>
-          <a:effectRef idx="0">
-            <a:schemeClr val="accent1"/>
-          </a:effectRef>
-          <a:fontRef idx="minor">
-            <a:schemeClr val="lt1"/>
-          </a:fontRef>
-        </p:style>
-        <p:txBody>
-          <a:bodyPr rtlCol="0" anchor="ctr"/>
-          <a:lstStyle/>
-          <a:p>
-            <a:pPr algn="ctr"/>
-            <a:r>
-              <a:rPr lang="en-PH" dirty="0">
-                <a:solidFill>
-                  <a:schemeClr val="bg1"/>
-                </a:solidFill>
-              </a:rPr>
-              <a:t>  </a:t>
-            </a:r>
-            <a:r>
-              <a:rPr lang="en-PH">
-                <a:solidFill>
-                  <a:schemeClr val="bg1"/>
-                </a:solidFill>
-              </a:rPr>
-              <a:t>TNC 600 </a:t>
-            </a:r>
-            <a:r>
-              <a:rPr lang="en-PH" dirty="0">
-                <a:solidFill>
-                  <a:schemeClr val="bg1"/>
-                </a:solidFill>
-              </a:rPr>
-              <a:t>Meters</a:t>
-            </a:r>
-          </a:p>
-        </p:txBody>
-      </p:sp>
-      <p:sp>
-        <p:nvSpPr>
-          <p:cNvPr id="67" name="TextBox 66">
-            <a:extLst>
-              <a:ext uri="{FF2B5EF4-FFF2-40B4-BE49-F238E27FC236}">
-                <a16:creationId xmlns:a16="http://schemas.microsoft.com/office/drawing/2014/main" id="{49BD507F-E7A4-4BE2-BFA9-DB6B869F5AA4}"/>
-              </a:ext>
-            </a:extLst>
-          </p:cNvPr>
-          <p:cNvSpPr txBox="1"/>
-          <p:nvPr/>
-        </p:nvSpPr>
-        <p:spPr>
-          <a:xfrm>
-            <a:off x="5120569" y="4730107"/>
-            <a:ext cx="1994456" cy="369332"/>
-          </a:xfrm>
-          <a:prstGeom prst="rect">
-            <a:avLst/>
-          </a:prstGeom>
-          <a:noFill/>
-          <a:ln>
-            <a:solidFill>
-              <a:schemeClr val="tx1"/>
-            </a:solidFill>
-          </a:ln>
-        </p:spPr>
-        <p:txBody>
-          <a:bodyPr wrap="square" rtlCol="0">
-            <a:spAutoFit/>
-          </a:bodyPr>
-          <a:lstStyle/>
-          <a:p>
-            <a:pPr algn="ctr"/>
-            <a:r>
-              <a:rPr lang="en-PH" b="1" dirty="0">
-                <a:latin typeface="Gill Sans MT" panose="020B0502020104020203" pitchFamily="34" charset="0"/>
-              </a:rPr>
-              <a:t>SHOW IN MAP </a:t>
-            </a:r>
-          </a:p>
-        </p:txBody>
-      </p:sp>
-      <p:pic>
-        <p:nvPicPr>
-          <p:cNvPr id="43" name="Picture 42">
-            <a:extLst>
-              <a:ext uri="{FF2B5EF4-FFF2-40B4-BE49-F238E27FC236}">
-                <a16:creationId xmlns:a16="http://schemas.microsoft.com/office/drawing/2014/main" id="{7E4B440E-C9CE-40B1-8FA9-546DC6DC2EFA}"/>
-              </a:ext>
-            </a:extLst>
-          </p:cNvPr>
-          <p:cNvPicPr>
-            <a:picLocks noChangeAspect="1"/>
-          </p:cNvPicPr>
-          <p:nvPr/>
-        </p:nvPicPr>
-        <p:blipFill>
-          <a:blip r:embed="rId2"/>
-          <a:stretch>
-            <a:fillRect/>
-          </a:stretch>
-        </p:blipFill>
-        <p:spPr>
-          <a:xfrm>
-            <a:off x="8616185" y="1588202"/>
-            <a:ext cx="2566374" cy="3511237"/>
-          </a:xfrm>
-          <a:prstGeom prst="rect">
-            <a:avLst/>
-          </a:prstGeom>
-        </p:spPr>
-      </p:pic>
-      <p:sp>
-        <p:nvSpPr>
-          <p:cNvPr id="44" name="TextBox 43">
-            <a:extLst>
-              <a:ext uri="{FF2B5EF4-FFF2-40B4-BE49-F238E27FC236}">
-                <a16:creationId xmlns:a16="http://schemas.microsoft.com/office/drawing/2014/main" id="{B3A9B6FE-90F8-49D6-98AA-43E7924C5091}"/>
-              </a:ext>
-            </a:extLst>
-          </p:cNvPr>
-          <p:cNvSpPr txBox="1"/>
-          <p:nvPr/>
-        </p:nvSpPr>
-        <p:spPr>
-          <a:xfrm>
-            <a:off x="9110868" y="1186667"/>
-            <a:ext cx="1577009" cy="369332"/>
-          </a:xfrm>
-          <a:prstGeom prst="rect">
-            <a:avLst/>
-          </a:prstGeom>
-          <a:noFill/>
-        </p:spPr>
-        <p:txBody>
-          <a:bodyPr wrap="square" rtlCol="0">
-            <a:spAutoFit/>
-          </a:bodyPr>
-          <a:lstStyle/>
-          <a:p>
-            <a:pPr algn="ctr"/>
-            <a:r>
-              <a:rPr lang="en-PH" b="1" dirty="0">
-                <a:latin typeface="Gill Sans MT" panose="020B0502020104020203" pitchFamily="34" charset="0"/>
-              </a:rPr>
-              <a:t>ROG</a:t>
-            </a:r>
-          </a:p>
-        </p:txBody>
-      </p:sp>
-      <p:sp>
-        <p:nvSpPr>
-          <p:cNvPr id="71" name="Rectangle 70">
-            <a:extLst>
-              <a:ext uri="{FF2B5EF4-FFF2-40B4-BE49-F238E27FC236}">
-                <a16:creationId xmlns:a16="http://schemas.microsoft.com/office/drawing/2014/main" id="{980DBF87-7394-41BB-ACCB-52578386B5B3}"/>
-              </a:ext>
-            </a:extLst>
-          </p:cNvPr>
-          <p:cNvSpPr/>
-          <p:nvPr/>
-        </p:nvSpPr>
-        <p:spPr>
-          <a:xfrm>
-            <a:off x="1373479" y="5021140"/>
-            <a:ext cx="1381540" cy="493644"/>
-          </a:xfrm>
-          <a:prstGeom prst="rect">
-            <a:avLst/>
-          </a:prstGeom>
-          <a:solidFill>
-            <a:schemeClr val="bg1"/>
-          </a:solidFill>
-          <a:ln>
-            <a:solidFill>
-              <a:schemeClr val="tx1"/>
-            </a:solidFill>
-          </a:ln>
-        </p:spPr>
-        <p:style>
-          <a:lnRef idx="2">
-            <a:schemeClr val="accent1">
-              <a:shade val="50000"/>
-            </a:schemeClr>
-          </a:lnRef>
-          <a:fillRef idx="1">
-            <a:schemeClr val="accent1"/>
-          </a:fillRef>
-          <a:effectRef idx="0">
-            <a:schemeClr val="accent1"/>
-          </a:effectRef>
-          <a:fontRef idx="minor">
-            <a:schemeClr val="lt1"/>
-          </a:fontRef>
-        </p:style>
-        <p:txBody>
-          <a:bodyPr rtlCol="0" anchor="ctr"/>
-          <a:lstStyle/>
-          <a:p>
-            <a:pPr algn="ctr"/>
-            <a:r>
-              <a:rPr lang="en-PH" dirty="0">
-                <a:solidFill>
-                  <a:schemeClr val="tx1"/>
-                </a:solidFill>
-              </a:rPr>
-              <a:t>PC QUALITY</a:t>
-            </a:r>
-          </a:p>
-        </p:txBody>
-      </p:sp>
-      <p:sp>
-        <p:nvSpPr>
-          <p:cNvPr id="72" name="TextBox 71">
-            <a:extLst>
-              <a:ext uri="{FF2B5EF4-FFF2-40B4-BE49-F238E27FC236}">
-                <a16:creationId xmlns:a16="http://schemas.microsoft.com/office/drawing/2014/main" id="{36BD9C0D-9F0B-4671-A9A5-03B712693801}"/>
-              </a:ext>
-            </a:extLst>
-          </p:cNvPr>
-          <p:cNvSpPr txBox="1"/>
-          <p:nvPr/>
-        </p:nvSpPr>
-        <p:spPr>
-          <a:xfrm>
-            <a:off x="8779327" y="5157778"/>
-            <a:ext cx="2266594" cy="646331"/>
-          </a:xfrm>
-          <a:prstGeom prst="rect">
-            <a:avLst/>
-          </a:prstGeom>
-          <a:noFill/>
-          <a:ln>
-            <a:solidFill>
-              <a:schemeClr val="tx1"/>
-            </a:solidFill>
-          </a:ln>
-        </p:spPr>
-        <p:txBody>
-          <a:bodyPr wrap="square" rtlCol="0">
-            <a:spAutoFit/>
-          </a:bodyPr>
-          <a:lstStyle/>
-          <a:p>
-            <a:pPr algn="ctr"/>
-            <a:r>
-              <a:rPr lang="en-PH" sz="1200" b="1" dirty="0">
-                <a:latin typeface="Gill Sans MT" panose="020B0502020104020203" pitchFamily="34" charset="0"/>
-              </a:rPr>
-              <a:t>LOW PC – 13PHP HR </a:t>
-            </a:r>
-          </a:p>
-          <a:p>
-            <a:pPr algn="ctr"/>
-            <a:r>
-              <a:rPr lang="en-PH" sz="1200" b="1" dirty="0">
-                <a:latin typeface="Gill Sans MT" panose="020B0502020104020203" pitchFamily="34" charset="0"/>
-              </a:rPr>
-              <a:t>MID PC- 25 PHP HR</a:t>
-            </a:r>
-          </a:p>
-          <a:p>
-            <a:pPr algn="ctr"/>
-            <a:r>
-              <a:rPr lang="en-PH" sz="1200" b="1" dirty="0">
-                <a:latin typeface="Gill Sans MT" panose="020B0502020104020203" pitchFamily="34" charset="0"/>
-              </a:rPr>
-              <a:t>HIGH PC – 30PHP HR</a:t>
+            <a:r>
+              <a:rPr lang="en-PH" sz="13800" dirty="0"/>
+              <a:t>PROTOTYPE</a:t>
             </a:r>
           </a:p>
         </p:txBody>
@@ -15501,7 +16043,7 @@
     </p:spTree>
     <p:extLst>
       <p:ext uri="{BB962C8B-B14F-4D97-AF65-F5344CB8AC3E}">
-        <p14:creationId xmlns:p14="http://schemas.microsoft.com/office/powerpoint/2010/main" val="1226772311"/>
+        <p14:creationId xmlns:p14="http://schemas.microsoft.com/office/powerpoint/2010/main" val="755244714"/>
       </p:ext>
     </p:extLst>
   </p:cSld>
@@ -15978,18 +16520,18 @@
 </file>
 
 <file path=customXml/item2.xml><?xml version="1.0" encoding="utf-8"?>
+<p:properties xmlns:p="http://schemas.microsoft.com/office/2006/metadata/properties" xmlns:xsi="http://www.w3.org/2001/XMLSchema-instance" xmlns:pc="http://schemas.microsoft.com/office/infopath/2007/PartnerControls">
+  <documentManagement/>
+</p:properties>
+</file>
+
+<file path=customXml/item3.xml><?xml version="1.0" encoding="utf-8"?>
 <?mso-contentType ?>
 <FormTemplates xmlns="http://schemas.microsoft.com/sharepoint/v3/contenttype/forms">
   <Display>DocumentLibraryForm</Display>
   <Edit>DocumentLibraryForm</Edit>
   <New>DocumentLibraryForm</New>
 </FormTemplates>
-</file>
-
-<file path=customXml/item3.xml><?xml version="1.0" encoding="utf-8"?>
-<p:properties xmlns:p="http://schemas.microsoft.com/office/2006/metadata/properties" xmlns:xsi="http://www.w3.org/2001/XMLSchema-instance" xmlns:pc="http://schemas.microsoft.com/office/infopath/2007/PartnerControls">
-  <documentManagement/>
-</p:properties>
 </file>
 
 <file path=customXml/itemProps1.xml><?xml version="1.0" encoding="utf-8"?>
@@ -16012,14 +16554,6 @@
 </file>
 
 <file path=customXml/itemProps2.xml><?xml version="1.0" encoding="utf-8"?>
-<ds:datastoreItem xmlns:ds="http://schemas.openxmlformats.org/officeDocument/2006/customXml" ds:itemID="{D7EDC7EB-0DC1-44C1-867C-7EF6FE677BC5}">
-  <ds:schemaRefs>
-    <ds:schemaRef ds:uri="http://schemas.microsoft.com/sharepoint/v3/contenttype/forms"/>
-  </ds:schemaRefs>
-</ds:datastoreItem>
-</file>
-
-<file path=customXml/itemProps3.xml><?xml version="1.0" encoding="utf-8"?>
 <ds:datastoreItem xmlns:ds="http://schemas.openxmlformats.org/officeDocument/2006/customXml" ds:itemID="{8C47A13B-D867-4692-B527-F6C7A8158F04}">
   <ds:schemaRefs>
     <ds:schemaRef ds:uri="http://www.w3.org/XML/1998/namespace"/>
@@ -16034,4 +16568,12 @@
     <ds:schemaRef ds:uri="http://purl.org/dc/elements/1.1/"/>
   </ds:schemaRefs>
 </ds:datastoreItem>
+</file>
+
+<file path=customXml/itemProps3.xml><?xml version="1.0" encoding="utf-8"?>
+<ds:datastoreItem xmlns:ds="http://schemas.openxmlformats.org/officeDocument/2006/customXml" ds:itemID="{D7EDC7EB-0DC1-44C1-867C-7EF6FE677BC5}">
+  <ds:schemaRefs>
+    <ds:schemaRef ds:uri="http://schemas.microsoft.com/sharepoint/v3/contenttype/forms"/>
+  </ds:schemaRefs>
+</ds:datastoreItem>
 </file>
</xml_diff>